<commit_message>
Improvement of keyboard input
</commit_message>
<xml_diff>
--- a/assets/sprites.pptx
+++ b/assets/sprites.pptx
@@ -261,7 +261,7 @@
           <a:p>
             <a:fld id="{D569C33A-239F-7941-8ECE-09BE103E178C}" type="datetimeFigureOut">
               <a:rPr lang="fr-FR" smtClean="0"/>
-              <a:t>17/05/2022</a:t>
+              <a:t>24/05/2022</a:t>
             </a:fld>
             <a:endParaRPr lang="fr-FR"/>
           </a:p>
@@ -459,7 +459,7 @@
           <a:p>
             <a:fld id="{D569C33A-239F-7941-8ECE-09BE103E178C}" type="datetimeFigureOut">
               <a:rPr lang="fr-FR" smtClean="0"/>
-              <a:t>17/05/2022</a:t>
+              <a:t>24/05/2022</a:t>
             </a:fld>
             <a:endParaRPr lang="fr-FR"/>
           </a:p>
@@ -667,7 +667,7 @@
           <a:p>
             <a:fld id="{D569C33A-239F-7941-8ECE-09BE103E178C}" type="datetimeFigureOut">
               <a:rPr lang="fr-FR" smtClean="0"/>
-              <a:t>17/05/2022</a:t>
+              <a:t>24/05/2022</a:t>
             </a:fld>
             <a:endParaRPr lang="fr-FR"/>
           </a:p>
@@ -865,7 +865,7 @@
           <a:p>
             <a:fld id="{D569C33A-239F-7941-8ECE-09BE103E178C}" type="datetimeFigureOut">
               <a:rPr lang="fr-FR" smtClean="0"/>
-              <a:t>17/05/2022</a:t>
+              <a:t>24/05/2022</a:t>
             </a:fld>
             <a:endParaRPr lang="fr-FR"/>
           </a:p>
@@ -1140,7 +1140,7 @@
           <a:p>
             <a:fld id="{D569C33A-239F-7941-8ECE-09BE103E178C}" type="datetimeFigureOut">
               <a:rPr lang="fr-FR" smtClean="0"/>
-              <a:t>17/05/2022</a:t>
+              <a:t>24/05/2022</a:t>
             </a:fld>
             <a:endParaRPr lang="fr-FR"/>
           </a:p>
@@ -1405,7 +1405,7 @@
           <a:p>
             <a:fld id="{D569C33A-239F-7941-8ECE-09BE103E178C}" type="datetimeFigureOut">
               <a:rPr lang="fr-FR" smtClean="0"/>
-              <a:t>17/05/2022</a:t>
+              <a:t>24/05/2022</a:t>
             </a:fld>
             <a:endParaRPr lang="fr-FR"/>
           </a:p>
@@ -1817,7 +1817,7 @@
           <a:p>
             <a:fld id="{D569C33A-239F-7941-8ECE-09BE103E178C}" type="datetimeFigureOut">
               <a:rPr lang="fr-FR" smtClean="0"/>
-              <a:t>17/05/2022</a:t>
+              <a:t>24/05/2022</a:t>
             </a:fld>
             <a:endParaRPr lang="fr-FR"/>
           </a:p>
@@ -1958,7 +1958,7 @@
           <a:p>
             <a:fld id="{D569C33A-239F-7941-8ECE-09BE103E178C}" type="datetimeFigureOut">
               <a:rPr lang="fr-FR" smtClean="0"/>
-              <a:t>17/05/2022</a:t>
+              <a:t>24/05/2022</a:t>
             </a:fld>
             <a:endParaRPr lang="fr-FR"/>
           </a:p>
@@ -2071,7 +2071,7 @@
           <a:p>
             <a:fld id="{D569C33A-239F-7941-8ECE-09BE103E178C}" type="datetimeFigureOut">
               <a:rPr lang="fr-FR" smtClean="0"/>
-              <a:t>17/05/2022</a:t>
+              <a:t>24/05/2022</a:t>
             </a:fld>
             <a:endParaRPr lang="fr-FR"/>
           </a:p>
@@ -2382,7 +2382,7 @@
           <a:p>
             <a:fld id="{D569C33A-239F-7941-8ECE-09BE103E178C}" type="datetimeFigureOut">
               <a:rPr lang="fr-FR" smtClean="0"/>
-              <a:t>17/05/2022</a:t>
+              <a:t>24/05/2022</a:t>
             </a:fld>
             <a:endParaRPr lang="fr-FR"/>
           </a:p>
@@ -2670,7 +2670,7 @@
           <a:p>
             <a:fld id="{D569C33A-239F-7941-8ECE-09BE103E178C}" type="datetimeFigureOut">
               <a:rPr lang="fr-FR" smtClean="0"/>
-              <a:t>17/05/2022</a:t>
+              <a:t>24/05/2022</a:t>
             </a:fld>
             <a:endParaRPr lang="fr-FR"/>
           </a:p>
@@ -2911,7 +2911,7 @@
           <a:p>
             <a:fld id="{D569C33A-239F-7941-8ECE-09BE103E178C}" type="datetimeFigureOut">
               <a:rPr lang="fr-FR" smtClean="0"/>
-              <a:t>17/05/2022</a:t>
+              <a:t>24/05/2022</a:t>
             </a:fld>
             <a:endParaRPr lang="fr-FR"/>
           </a:p>
@@ -3330,10 +3330,10 @@
       </p:grpSpPr>
       <p:grpSp>
         <p:nvGrpSpPr>
-          <p:cNvPr id="169" name="Groupe 168">
+          <p:cNvPr id="2" name="Groupe 1">
             <a:extLst>
               <a:ext uri="{FF2B5EF4-FFF2-40B4-BE49-F238E27FC236}">
-                <a16:creationId xmlns:a16="http://schemas.microsoft.com/office/drawing/2014/main" id="{7E807A38-486F-F367-A4A4-F844DB22999C}"/>
+                <a16:creationId xmlns:a16="http://schemas.microsoft.com/office/drawing/2014/main" id="{2134D5D1-DA40-87EB-9A1D-CF06EBFF7EAD}"/>
               </a:ext>
             </a:extLst>
           </p:cNvPr>
@@ -3342,10 +3342,10 @@
         </p:nvGrpSpPr>
         <p:grpSpPr>
           <a:xfrm>
-            <a:off x="183507" y="480587"/>
-            <a:ext cx="6774357" cy="3401900"/>
-            <a:chOff x="183507" y="480587"/>
-            <a:chExt cx="6774357" cy="3401900"/>
+            <a:off x="140363" y="480587"/>
+            <a:ext cx="6823382" cy="4666656"/>
+            <a:chOff x="140363" y="480587"/>
+            <a:chExt cx="6823382" cy="4666656"/>
           </a:xfrm>
         </p:grpSpPr>
         <p:grpSp>
@@ -5603,7 +5603,7 @@
           </p:nvGrpSpPr>
           <p:grpSpPr>
             <a:xfrm>
-              <a:off x="183507" y="2292468"/>
+              <a:off x="189388" y="3557224"/>
               <a:ext cx="6774357" cy="1590019"/>
               <a:chOff x="183507" y="2292468"/>
               <a:chExt cx="6774357" cy="1590019"/>
@@ -7780,6 +7780,2247 @@
                       <a:extLst>
                         <a:ext uri="{FF2B5EF4-FFF2-40B4-BE49-F238E27FC236}">
                           <a16:creationId xmlns:a16="http://schemas.microsoft.com/office/drawing/2014/main" id="{1186D197-B222-B538-772B-4B6B47B18F6F}"/>
+                        </a:ext>
+                      </a:extLst>
+                    </p:cNvPr>
+                    <p:cNvSpPr/>
+                    <p:nvPr/>
+                  </p:nvSpPr>
+                  <p:spPr>
+                    <a:xfrm rot="5400000">
+                      <a:off x="5966450" y="1712307"/>
+                      <a:ext cx="665704" cy="517793"/>
+                    </a:xfrm>
+                    <a:prstGeom prst="flowChartDelay">
+                      <a:avLst/>
+                    </a:prstGeom>
+                    <a:grpFill/>
+                    <a:ln>
+                      <a:solidFill>
+                        <a:schemeClr val="bg1"/>
+                      </a:solidFill>
+                    </a:ln>
+                  </p:spPr>
+                  <p:style>
+                    <a:lnRef idx="2">
+                      <a:schemeClr val="accent1">
+                        <a:shade val="50000"/>
+                      </a:schemeClr>
+                    </a:lnRef>
+                    <a:fillRef idx="1">
+                      <a:schemeClr val="accent1"/>
+                    </a:fillRef>
+                    <a:effectRef idx="0">
+                      <a:schemeClr val="accent1"/>
+                    </a:effectRef>
+                    <a:fontRef idx="minor">
+                      <a:schemeClr val="lt1"/>
+                    </a:fontRef>
+                  </p:style>
+                  <p:txBody>
+                    <a:bodyPr rtlCol="0" anchor="ctr"/>
+                    <a:lstStyle/>
+                    <a:p>
+                      <a:pPr algn="ctr"/>
+                      <a:endParaRPr lang="fr-FR"/>
+                    </a:p>
+                  </p:txBody>
+                </p:sp>
+              </p:grpSp>
+            </p:grpSp>
+          </p:grpSp>
+        </p:grpSp>
+        <p:grpSp>
+          <p:nvGrpSpPr>
+            <p:cNvPr id="101" name="Groupe 100">
+              <a:extLst>
+                <a:ext uri="{FF2B5EF4-FFF2-40B4-BE49-F238E27FC236}">
+                  <a16:creationId xmlns:a16="http://schemas.microsoft.com/office/drawing/2014/main" id="{4DC84ABD-DDCC-620D-FC63-612D3A0DA505}"/>
+                </a:ext>
+              </a:extLst>
+            </p:cNvPr>
+            <p:cNvGrpSpPr/>
+            <p:nvPr/>
+          </p:nvGrpSpPr>
+          <p:grpSpPr>
+            <a:xfrm flipH="1">
+              <a:off x="140363" y="2067019"/>
+              <a:ext cx="6816572" cy="1247446"/>
+              <a:chOff x="183507" y="480587"/>
+              <a:chExt cx="6774357" cy="1247446"/>
+            </a:xfrm>
+          </p:grpSpPr>
+          <p:grpSp>
+            <p:nvGrpSpPr>
+              <p:cNvPr id="102" name="Groupe 101">
+                <a:extLst>
+                  <a:ext uri="{FF2B5EF4-FFF2-40B4-BE49-F238E27FC236}">
+                    <a16:creationId xmlns:a16="http://schemas.microsoft.com/office/drawing/2014/main" id="{09A09273-A42F-DA62-734C-9C604DBD190A}"/>
+                  </a:ext>
+                </a:extLst>
+              </p:cNvPr>
+              <p:cNvGrpSpPr/>
+              <p:nvPr/>
+            </p:nvGrpSpPr>
+            <p:grpSpPr>
+              <a:xfrm>
+                <a:off x="183507" y="480587"/>
+                <a:ext cx="2102489" cy="1247446"/>
+                <a:chOff x="2375863" y="1835310"/>
+                <a:chExt cx="3590587" cy="2100408"/>
+              </a:xfrm>
+            </p:grpSpPr>
+            <p:sp>
+              <p:nvSpPr>
+                <p:cNvPr id="186" name="Forme libre 185">
+                  <a:extLst>
+                    <a:ext uri="{FF2B5EF4-FFF2-40B4-BE49-F238E27FC236}">
+                      <a16:creationId xmlns:a16="http://schemas.microsoft.com/office/drawing/2014/main" id="{87EE1786-84A4-0462-3D51-EEF0DC263F26}"/>
+                    </a:ext>
+                  </a:extLst>
+                </p:cNvPr>
+                <p:cNvSpPr/>
+                <p:nvPr/>
+              </p:nvSpPr>
+              <p:spPr>
+                <a:xfrm>
+                  <a:off x="2375863" y="1835310"/>
+                  <a:ext cx="3590587" cy="2100408"/>
+                </a:xfrm>
+                <a:custGeom>
+                  <a:avLst/>
+                  <a:gdLst>
+                    <a:gd name="connsiteX0" fmla="*/ 642759 w 3590587"/>
+                    <a:gd name="connsiteY0" fmla="*/ 2064661 h 2100408"/>
+                    <a:gd name="connsiteX1" fmla="*/ 2879183 w 3590587"/>
+                    <a:gd name="connsiteY1" fmla="*/ 2053644 h 2100408"/>
+                    <a:gd name="connsiteX2" fmla="*/ 3562229 w 3590587"/>
+                    <a:gd name="connsiteY2" fmla="*/ 1557885 h 2100408"/>
+                    <a:gd name="connsiteX3" fmla="*/ 3396976 w 3590587"/>
+                    <a:gd name="connsiteY3" fmla="*/ 720603 h 2100408"/>
+                    <a:gd name="connsiteX4" fmla="*/ 2813082 w 3590587"/>
+                    <a:gd name="connsiteY4" fmla="*/ 213827 h 2100408"/>
+                    <a:gd name="connsiteX5" fmla="*/ 1535125 w 3590587"/>
+                    <a:gd name="connsiteY5" fmla="*/ 4507 h 2100408"/>
+                    <a:gd name="connsiteX6" fmla="*/ 532590 w 3590587"/>
+                    <a:gd name="connsiteY6" fmla="*/ 390097 h 2100408"/>
+                    <a:gd name="connsiteX7" fmla="*/ 36831 w 3590587"/>
+                    <a:gd name="connsiteY7" fmla="*/ 1139244 h 2100408"/>
+                    <a:gd name="connsiteX8" fmla="*/ 102932 w 3590587"/>
+                    <a:gd name="connsiteY8" fmla="*/ 1921442 h 2100408"/>
+                    <a:gd name="connsiteX9" fmla="*/ 642759 w 3590587"/>
+                    <a:gd name="connsiteY9" fmla="*/ 2064661 h 2100408"/>
+                  </a:gdLst>
+                  <a:ahLst/>
+                  <a:cxnLst>
+                    <a:cxn ang="0">
+                      <a:pos x="connsiteX0" y="connsiteY0"/>
+                    </a:cxn>
+                    <a:cxn ang="0">
+                      <a:pos x="connsiteX1" y="connsiteY1"/>
+                    </a:cxn>
+                    <a:cxn ang="0">
+                      <a:pos x="connsiteX2" y="connsiteY2"/>
+                    </a:cxn>
+                    <a:cxn ang="0">
+                      <a:pos x="connsiteX3" y="connsiteY3"/>
+                    </a:cxn>
+                    <a:cxn ang="0">
+                      <a:pos x="connsiteX4" y="connsiteY4"/>
+                    </a:cxn>
+                    <a:cxn ang="0">
+                      <a:pos x="connsiteX5" y="connsiteY5"/>
+                    </a:cxn>
+                    <a:cxn ang="0">
+                      <a:pos x="connsiteX6" y="connsiteY6"/>
+                    </a:cxn>
+                    <a:cxn ang="0">
+                      <a:pos x="connsiteX7" y="connsiteY7"/>
+                    </a:cxn>
+                    <a:cxn ang="0">
+                      <a:pos x="connsiteX8" y="connsiteY8"/>
+                    </a:cxn>
+                    <a:cxn ang="0">
+                      <a:pos x="connsiteX9" y="connsiteY9"/>
+                    </a:cxn>
+                  </a:cxnLst>
+                  <a:rect l="l" t="t" r="r" b="b"/>
+                  <a:pathLst>
+                    <a:path w="3590587" h="2100408">
+                      <a:moveTo>
+                        <a:pt x="642759" y="2064661"/>
+                      </a:moveTo>
+                      <a:cubicBezTo>
+                        <a:pt x="1105467" y="2086695"/>
+                        <a:pt x="2392605" y="2138107"/>
+                        <a:pt x="2879183" y="2053644"/>
+                      </a:cubicBezTo>
+                      <a:cubicBezTo>
+                        <a:pt x="3365761" y="1969181"/>
+                        <a:pt x="3475930" y="1780058"/>
+                        <a:pt x="3562229" y="1557885"/>
+                      </a:cubicBezTo>
+                      <a:cubicBezTo>
+                        <a:pt x="3648528" y="1335712"/>
+                        <a:pt x="3521834" y="944613"/>
+                        <a:pt x="3396976" y="720603"/>
+                      </a:cubicBezTo>
+                      <a:cubicBezTo>
+                        <a:pt x="3272118" y="496593"/>
+                        <a:pt x="3123391" y="333176"/>
+                        <a:pt x="2813082" y="213827"/>
+                      </a:cubicBezTo>
+                      <a:cubicBezTo>
+                        <a:pt x="2502774" y="94478"/>
+                        <a:pt x="1915207" y="-24871"/>
+                        <a:pt x="1535125" y="4507"/>
+                      </a:cubicBezTo>
+                      <a:cubicBezTo>
+                        <a:pt x="1155043" y="33885"/>
+                        <a:pt x="782306" y="200974"/>
+                        <a:pt x="532590" y="390097"/>
+                      </a:cubicBezTo>
+                      <a:cubicBezTo>
+                        <a:pt x="282874" y="579220"/>
+                        <a:pt x="108441" y="884020"/>
+                        <a:pt x="36831" y="1139244"/>
+                      </a:cubicBezTo>
+                      <a:cubicBezTo>
+                        <a:pt x="-34779" y="1394468"/>
+                        <a:pt x="3780" y="1767206"/>
+                        <a:pt x="102932" y="1921442"/>
+                      </a:cubicBezTo>
+                      <a:cubicBezTo>
+                        <a:pt x="202084" y="2075678"/>
+                        <a:pt x="180051" y="2042627"/>
+                        <a:pt x="642759" y="2064661"/>
+                      </a:cubicBezTo>
+                      <a:close/>
+                    </a:path>
+                  </a:pathLst>
+                </a:custGeom>
+                <a:solidFill>
+                  <a:srgbClr val="CC000E"/>
+                </a:solidFill>
+                <a:ln>
+                  <a:solidFill>
+                    <a:srgbClr val="CC000E"/>
+                  </a:solidFill>
+                </a:ln>
+              </p:spPr>
+              <p:style>
+                <a:lnRef idx="2">
+                  <a:schemeClr val="accent1">
+                    <a:shade val="50000"/>
+                  </a:schemeClr>
+                </a:lnRef>
+                <a:fillRef idx="1">
+                  <a:schemeClr val="accent1"/>
+                </a:fillRef>
+                <a:effectRef idx="0">
+                  <a:schemeClr val="accent1"/>
+                </a:effectRef>
+                <a:fontRef idx="minor">
+                  <a:schemeClr val="lt1"/>
+                </a:fontRef>
+              </p:style>
+              <p:txBody>
+                <a:bodyPr rtlCol="0" anchor="ctr"/>
+                <a:lstStyle/>
+                <a:p>
+                  <a:pPr algn="ctr"/>
+                  <a:endParaRPr lang="fr-FR"/>
+                </a:p>
+              </p:txBody>
+            </p:sp>
+            <p:grpSp>
+              <p:nvGrpSpPr>
+                <p:cNvPr id="187" name="Groupe 186">
+                  <a:extLst>
+                    <a:ext uri="{FF2B5EF4-FFF2-40B4-BE49-F238E27FC236}">
+                      <a16:creationId xmlns:a16="http://schemas.microsoft.com/office/drawing/2014/main" id="{B00828EC-1255-EF3A-7252-410F6206154E}"/>
+                    </a:ext>
+                  </a:extLst>
+                </p:cNvPr>
+                <p:cNvGrpSpPr/>
+                <p:nvPr/>
+              </p:nvGrpSpPr>
+              <p:grpSpPr>
+                <a:xfrm>
+                  <a:off x="5062149" y="2206422"/>
+                  <a:ext cx="327344" cy="657849"/>
+                  <a:chOff x="6040406" y="972647"/>
+                  <a:chExt cx="327344" cy="657849"/>
+                </a:xfrm>
+              </p:grpSpPr>
+              <p:grpSp>
+                <p:nvGrpSpPr>
+                  <p:cNvPr id="195" name="Groupe 194">
+                    <a:extLst>
+                      <a:ext uri="{FF2B5EF4-FFF2-40B4-BE49-F238E27FC236}">
+                        <a16:creationId xmlns:a16="http://schemas.microsoft.com/office/drawing/2014/main" id="{1AEFD8A8-B037-3DCC-8D83-874408AECC00}"/>
+                      </a:ext>
+                    </a:extLst>
+                  </p:cNvPr>
+                  <p:cNvGrpSpPr/>
+                  <p:nvPr/>
+                </p:nvGrpSpPr>
+                <p:grpSpPr>
+                  <a:xfrm>
+                    <a:off x="6040406" y="972647"/>
+                    <a:ext cx="327344" cy="657849"/>
+                    <a:chOff x="6040405" y="972647"/>
+                    <a:chExt cx="517793" cy="1331409"/>
+                  </a:xfrm>
+                </p:grpSpPr>
+                <p:sp>
+                  <p:nvSpPr>
+                    <p:cNvPr id="199" name="Délai  198">
+                      <a:extLst>
+                        <a:ext uri="{FF2B5EF4-FFF2-40B4-BE49-F238E27FC236}">
+                          <a16:creationId xmlns:a16="http://schemas.microsoft.com/office/drawing/2014/main" id="{22B83A50-4900-9754-241D-0E3BE9067666}"/>
+                        </a:ext>
+                      </a:extLst>
+                    </p:cNvPr>
+                    <p:cNvSpPr/>
+                    <p:nvPr/>
+                  </p:nvSpPr>
+                  <p:spPr>
+                    <a:xfrm rot="16200000">
+                      <a:off x="5966450" y="1046602"/>
+                      <a:ext cx="665704" cy="517793"/>
+                    </a:xfrm>
+                    <a:prstGeom prst="flowChartDelay">
+                      <a:avLst/>
+                    </a:prstGeom>
+                    <a:solidFill>
+                      <a:schemeClr val="tx1"/>
+                    </a:solidFill>
+                    <a:ln>
+                      <a:solidFill>
+                        <a:schemeClr val="tx1"/>
+                      </a:solidFill>
+                    </a:ln>
+                  </p:spPr>
+                  <p:style>
+                    <a:lnRef idx="2">
+                      <a:schemeClr val="accent1">
+                        <a:shade val="50000"/>
+                      </a:schemeClr>
+                    </a:lnRef>
+                    <a:fillRef idx="1">
+                      <a:schemeClr val="accent1"/>
+                    </a:fillRef>
+                    <a:effectRef idx="0">
+                      <a:schemeClr val="accent1"/>
+                    </a:effectRef>
+                    <a:fontRef idx="minor">
+                      <a:schemeClr val="lt1"/>
+                    </a:fontRef>
+                  </p:style>
+                  <p:txBody>
+                    <a:bodyPr rtlCol="0" anchor="ctr"/>
+                    <a:lstStyle/>
+                    <a:p>
+                      <a:pPr algn="ctr"/>
+                      <a:endParaRPr lang="fr-FR"/>
+                    </a:p>
+                  </p:txBody>
+                </p:sp>
+                <p:sp>
+                  <p:nvSpPr>
+                    <p:cNvPr id="200" name="Délai  199">
+                      <a:extLst>
+                        <a:ext uri="{FF2B5EF4-FFF2-40B4-BE49-F238E27FC236}">
+                          <a16:creationId xmlns:a16="http://schemas.microsoft.com/office/drawing/2014/main" id="{7F7D5767-1A16-22C5-056D-A20FC0D1DD1A}"/>
+                        </a:ext>
+                      </a:extLst>
+                    </p:cNvPr>
+                    <p:cNvSpPr/>
+                    <p:nvPr/>
+                  </p:nvSpPr>
+                  <p:spPr>
+                    <a:xfrm rot="5400000">
+                      <a:off x="5966450" y="1712307"/>
+                      <a:ext cx="665704" cy="517793"/>
+                    </a:xfrm>
+                    <a:prstGeom prst="flowChartDelay">
+                      <a:avLst/>
+                    </a:prstGeom>
+                    <a:solidFill>
+                      <a:schemeClr val="tx1"/>
+                    </a:solidFill>
+                    <a:ln>
+                      <a:solidFill>
+                        <a:schemeClr val="tx1"/>
+                      </a:solidFill>
+                    </a:ln>
+                  </p:spPr>
+                  <p:style>
+                    <a:lnRef idx="2">
+                      <a:schemeClr val="accent1">
+                        <a:shade val="50000"/>
+                      </a:schemeClr>
+                    </a:lnRef>
+                    <a:fillRef idx="1">
+                      <a:schemeClr val="accent1"/>
+                    </a:fillRef>
+                    <a:effectRef idx="0">
+                      <a:schemeClr val="accent1"/>
+                    </a:effectRef>
+                    <a:fontRef idx="minor">
+                      <a:schemeClr val="lt1"/>
+                    </a:fontRef>
+                  </p:style>
+                  <p:txBody>
+                    <a:bodyPr rtlCol="0" anchor="ctr"/>
+                    <a:lstStyle/>
+                    <a:p>
+                      <a:pPr algn="ctr"/>
+                      <a:endParaRPr lang="fr-FR"/>
+                    </a:p>
+                  </p:txBody>
+                </p:sp>
+              </p:grpSp>
+              <p:grpSp>
+                <p:nvGrpSpPr>
+                  <p:cNvPr id="196" name="Groupe 195">
+                    <a:extLst>
+                      <a:ext uri="{FF2B5EF4-FFF2-40B4-BE49-F238E27FC236}">
+                        <a16:creationId xmlns:a16="http://schemas.microsoft.com/office/drawing/2014/main" id="{F71DA54F-EBF0-A16B-1011-7223B29529AE}"/>
+                      </a:ext>
+                    </a:extLst>
+                  </p:cNvPr>
+                  <p:cNvGrpSpPr/>
+                  <p:nvPr/>
+                </p:nvGrpSpPr>
+                <p:grpSpPr>
+                  <a:xfrm>
+                    <a:off x="6204078" y="1061572"/>
+                    <a:ext cx="55594" cy="328925"/>
+                    <a:chOff x="6040405" y="972647"/>
+                    <a:chExt cx="517793" cy="1331409"/>
+                  </a:xfrm>
+                  <a:solidFill>
+                    <a:schemeClr val="bg1"/>
+                  </a:solidFill>
+                </p:grpSpPr>
+                <p:sp>
+                  <p:nvSpPr>
+                    <p:cNvPr id="197" name="Délai  196">
+                      <a:extLst>
+                        <a:ext uri="{FF2B5EF4-FFF2-40B4-BE49-F238E27FC236}">
+                          <a16:creationId xmlns:a16="http://schemas.microsoft.com/office/drawing/2014/main" id="{2A147665-E72E-B670-48B7-45E3DE53876A}"/>
+                        </a:ext>
+                      </a:extLst>
+                    </p:cNvPr>
+                    <p:cNvSpPr/>
+                    <p:nvPr/>
+                  </p:nvSpPr>
+                  <p:spPr>
+                    <a:xfrm rot="16200000">
+                      <a:off x="5966450" y="1046602"/>
+                      <a:ext cx="665704" cy="517793"/>
+                    </a:xfrm>
+                    <a:prstGeom prst="flowChartDelay">
+                      <a:avLst/>
+                    </a:prstGeom>
+                    <a:grpFill/>
+                    <a:ln>
+                      <a:solidFill>
+                        <a:schemeClr val="bg1"/>
+                      </a:solidFill>
+                    </a:ln>
+                  </p:spPr>
+                  <p:style>
+                    <a:lnRef idx="2">
+                      <a:schemeClr val="accent1">
+                        <a:shade val="50000"/>
+                      </a:schemeClr>
+                    </a:lnRef>
+                    <a:fillRef idx="1">
+                      <a:schemeClr val="accent1"/>
+                    </a:fillRef>
+                    <a:effectRef idx="0">
+                      <a:schemeClr val="accent1"/>
+                    </a:effectRef>
+                    <a:fontRef idx="minor">
+                      <a:schemeClr val="lt1"/>
+                    </a:fontRef>
+                  </p:style>
+                  <p:txBody>
+                    <a:bodyPr rtlCol="0" anchor="ctr"/>
+                    <a:lstStyle/>
+                    <a:p>
+                      <a:pPr algn="ctr"/>
+                      <a:endParaRPr lang="fr-FR"/>
+                    </a:p>
+                  </p:txBody>
+                </p:sp>
+                <p:sp>
+                  <p:nvSpPr>
+                    <p:cNvPr id="198" name="Délai  197">
+                      <a:extLst>
+                        <a:ext uri="{FF2B5EF4-FFF2-40B4-BE49-F238E27FC236}">
+                          <a16:creationId xmlns:a16="http://schemas.microsoft.com/office/drawing/2014/main" id="{37BA298C-F63A-92D1-1586-206367CF9265}"/>
+                        </a:ext>
+                      </a:extLst>
+                    </p:cNvPr>
+                    <p:cNvSpPr/>
+                    <p:nvPr/>
+                  </p:nvSpPr>
+                  <p:spPr>
+                    <a:xfrm rot="5400000">
+                      <a:off x="5966450" y="1712307"/>
+                      <a:ext cx="665704" cy="517793"/>
+                    </a:xfrm>
+                    <a:prstGeom prst="flowChartDelay">
+                      <a:avLst/>
+                    </a:prstGeom>
+                    <a:grpFill/>
+                    <a:ln>
+                      <a:solidFill>
+                        <a:schemeClr val="bg1"/>
+                      </a:solidFill>
+                    </a:ln>
+                  </p:spPr>
+                  <p:style>
+                    <a:lnRef idx="2">
+                      <a:schemeClr val="accent1">
+                        <a:shade val="50000"/>
+                      </a:schemeClr>
+                    </a:lnRef>
+                    <a:fillRef idx="1">
+                      <a:schemeClr val="accent1"/>
+                    </a:fillRef>
+                    <a:effectRef idx="0">
+                      <a:schemeClr val="accent1"/>
+                    </a:effectRef>
+                    <a:fontRef idx="minor">
+                      <a:schemeClr val="lt1"/>
+                    </a:fontRef>
+                  </p:style>
+                  <p:txBody>
+                    <a:bodyPr rtlCol="0" anchor="ctr"/>
+                    <a:lstStyle/>
+                    <a:p>
+                      <a:pPr algn="ctr"/>
+                      <a:endParaRPr lang="fr-FR"/>
+                    </a:p>
+                  </p:txBody>
+                </p:sp>
+              </p:grpSp>
+            </p:grpSp>
+            <p:grpSp>
+              <p:nvGrpSpPr>
+                <p:cNvPr id="188" name="Groupe 187">
+                  <a:extLst>
+                    <a:ext uri="{FF2B5EF4-FFF2-40B4-BE49-F238E27FC236}">
+                      <a16:creationId xmlns:a16="http://schemas.microsoft.com/office/drawing/2014/main" id="{E5051261-6CE6-00A2-A748-D7104A613EE0}"/>
+                    </a:ext>
+                  </a:extLst>
+                </p:cNvPr>
+                <p:cNvGrpSpPr/>
+                <p:nvPr/>
+              </p:nvGrpSpPr>
+              <p:grpSpPr>
+                <a:xfrm>
+                  <a:off x="4485192" y="2206422"/>
+                  <a:ext cx="327344" cy="657849"/>
+                  <a:chOff x="6040406" y="972647"/>
+                  <a:chExt cx="327344" cy="657849"/>
+                </a:xfrm>
+              </p:grpSpPr>
+              <p:grpSp>
+                <p:nvGrpSpPr>
+                  <p:cNvPr id="189" name="Groupe 188">
+                    <a:extLst>
+                      <a:ext uri="{FF2B5EF4-FFF2-40B4-BE49-F238E27FC236}">
+                        <a16:creationId xmlns:a16="http://schemas.microsoft.com/office/drawing/2014/main" id="{5F5DC8E9-4D2D-CB32-2151-D44507401AA2}"/>
+                      </a:ext>
+                    </a:extLst>
+                  </p:cNvPr>
+                  <p:cNvGrpSpPr/>
+                  <p:nvPr/>
+                </p:nvGrpSpPr>
+                <p:grpSpPr>
+                  <a:xfrm>
+                    <a:off x="6040406" y="972647"/>
+                    <a:ext cx="327344" cy="657849"/>
+                    <a:chOff x="6040405" y="972647"/>
+                    <a:chExt cx="517793" cy="1331409"/>
+                  </a:xfrm>
+                </p:grpSpPr>
+                <p:sp>
+                  <p:nvSpPr>
+                    <p:cNvPr id="193" name="Délai  192">
+                      <a:extLst>
+                        <a:ext uri="{FF2B5EF4-FFF2-40B4-BE49-F238E27FC236}">
+                          <a16:creationId xmlns:a16="http://schemas.microsoft.com/office/drawing/2014/main" id="{5D569C9D-EB40-0F24-17B7-51CE3790750E}"/>
+                        </a:ext>
+                      </a:extLst>
+                    </p:cNvPr>
+                    <p:cNvSpPr/>
+                    <p:nvPr/>
+                  </p:nvSpPr>
+                  <p:spPr>
+                    <a:xfrm rot="16200000">
+                      <a:off x="5966450" y="1046602"/>
+                      <a:ext cx="665704" cy="517793"/>
+                    </a:xfrm>
+                    <a:prstGeom prst="flowChartDelay">
+                      <a:avLst/>
+                    </a:prstGeom>
+                    <a:solidFill>
+                      <a:schemeClr val="tx1"/>
+                    </a:solidFill>
+                    <a:ln>
+                      <a:solidFill>
+                        <a:schemeClr val="tx1"/>
+                      </a:solidFill>
+                    </a:ln>
+                  </p:spPr>
+                  <p:style>
+                    <a:lnRef idx="2">
+                      <a:schemeClr val="accent1">
+                        <a:shade val="50000"/>
+                      </a:schemeClr>
+                    </a:lnRef>
+                    <a:fillRef idx="1">
+                      <a:schemeClr val="accent1"/>
+                    </a:fillRef>
+                    <a:effectRef idx="0">
+                      <a:schemeClr val="accent1"/>
+                    </a:effectRef>
+                    <a:fontRef idx="minor">
+                      <a:schemeClr val="lt1"/>
+                    </a:fontRef>
+                  </p:style>
+                  <p:txBody>
+                    <a:bodyPr rtlCol="0" anchor="ctr"/>
+                    <a:lstStyle/>
+                    <a:p>
+                      <a:pPr algn="ctr"/>
+                      <a:endParaRPr lang="fr-FR" dirty="0"/>
+                    </a:p>
+                  </p:txBody>
+                </p:sp>
+                <p:sp>
+                  <p:nvSpPr>
+                    <p:cNvPr id="194" name="Délai  193">
+                      <a:extLst>
+                        <a:ext uri="{FF2B5EF4-FFF2-40B4-BE49-F238E27FC236}">
+                          <a16:creationId xmlns:a16="http://schemas.microsoft.com/office/drawing/2014/main" id="{04D1A981-D76F-9B5A-9E81-8EA55D11BFF2}"/>
+                        </a:ext>
+                      </a:extLst>
+                    </p:cNvPr>
+                    <p:cNvSpPr/>
+                    <p:nvPr/>
+                  </p:nvSpPr>
+                  <p:spPr>
+                    <a:xfrm rot="5400000">
+                      <a:off x="5966450" y="1712307"/>
+                      <a:ext cx="665704" cy="517793"/>
+                    </a:xfrm>
+                    <a:prstGeom prst="flowChartDelay">
+                      <a:avLst/>
+                    </a:prstGeom>
+                    <a:solidFill>
+                      <a:schemeClr val="tx1"/>
+                    </a:solidFill>
+                    <a:ln>
+                      <a:solidFill>
+                        <a:schemeClr val="tx1"/>
+                      </a:solidFill>
+                    </a:ln>
+                  </p:spPr>
+                  <p:style>
+                    <a:lnRef idx="2">
+                      <a:schemeClr val="accent1">
+                        <a:shade val="50000"/>
+                      </a:schemeClr>
+                    </a:lnRef>
+                    <a:fillRef idx="1">
+                      <a:schemeClr val="accent1"/>
+                    </a:fillRef>
+                    <a:effectRef idx="0">
+                      <a:schemeClr val="accent1"/>
+                    </a:effectRef>
+                    <a:fontRef idx="minor">
+                      <a:schemeClr val="lt1"/>
+                    </a:fontRef>
+                  </p:style>
+                  <p:txBody>
+                    <a:bodyPr rtlCol="0" anchor="ctr"/>
+                    <a:lstStyle/>
+                    <a:p>
+                      <a:pPr algn="ctr"/>
+                      <a:endParaRPr lang="fr-FR"/>
+                    </a:p>
+                  </p:txBody>
+                </p:sp>
+              </p:grpSp>
+              <p:grpSp>
+                <p:nvGrpSpPr>
+                  <p:cNvPr id="190" name="Groupe 189">
+                    <a:extLst>
+                      <a:ext uri="{FF2B5EF4-FFF2-40B4-BE49-F238E27FC236}">
+                        <a16:creationId xmlns:a16="http://schemas.microsoft.com/office/drawing/2014/main" id="{37B91F9B-C541-1437-F7A6-B95493763E83}"/>
+                      </a:ext>
+                    </a:extLst>
+                  </p:cNvPr>
+                  <p:cNvGrpSpPr/>
+                  <p:nvPr/>
+                </p:nvGrpSpPr>
+                <p:grpSpPr>
+                  <a:xfrm>
+                    <a:off x="6204078" y="1061572"/>
+                    <a:ext cx="55594" cy="328925"/>
+                    <a:chOff x="6040405" y="972647"/>
+                    <a:chExt cx="517793" cy="1331409"/>
+                  </a:xfrm>
+                  <a:solidFill>
+                    <a:schemeClr val="bg1"/>
+                  </a:solidFill>
+                </p:grpSpPr>
+                <p:sp>
+                  <p:nvSpPr>
+                    <p:cNvPr id="191" name="Délai  190">
+                      <a:extLst>
+                        <a:ext uri="{FF2B5EF4-FFF2-40B4-BE49-F238E27FC236}">
+                          <a16:creationId xmlns:a16="http://schemas.microsoft.com/office/drawing/2014/main" id="{A937BA1E-BA11-8E04-A8BB-07E38480D6AF}"/>
+                        </a:ext>
+                      </a:extLst>
+                    </p:cNvPr>
+                    <p:cNvSpPr/>
+                    <p:nvPr/>
+                  </p:nvSpPr>
+                  <p:spPr>
+                    <a:xfrm rot="16200000">
+                      <a:off x="5966450" y="1046602"/>
+                      <a:ext cx="665704" cy="517793"/>
+                    </a:xfrm>
+                    <a:prstGeom prst="flowChartDelay">
+                      <a:avLst/>
+                    </a:prstGeom>
+                    <a:grpFill/>
+                    <a:ln>
+                      <a:solidFill>
+                        <a:schemeClr val="bg1"/>
+                      </a:solidFill>
+                    </a:ln>
+                  </p:spPr>
+                  <p:style>
+                    <a:lnRef idx="2">
+                      <a:schemeClr val="accent1">
+                        <a:shade val="50000"/>
+                      </a:schemeClr>
+                    </a:lnRef>
+                    <a:fillRef idx="1">
+                      <a:schemeClr val="accent1"/>
+                    </a:fillRef>
+                    <a:effectRef idx="0">
+                      <a:schemeClr val="accent1"/>
+                    </a:effectRef>
+                    <a:fontRef idx="minor">
+                      <a:schemeClr val="lt1"/>
+                    </a:fontRef>
+                  </p:style>
+                  <p:txBody>
+                    <a:bodyPr rtlCol="0" anchor="ctr"/>
+                    <a:lstStyle/>
+                    <a:p>
+                      <a:pPr algn="ctr"/>
+                      <a:endParaRPr lang="fr-FR"/>
+                    </a:p>
+                  </p:txBody>
+                </p:sp>
+                <p:sp>
+                  <p:nvSpPr>
+                    <p:cNvPr id="192" name="Délai  191">
+                      <a:extLst>
+                        <a:ext uri="{FF2B5EF4-FFF2-40B4-BE49-F238E27FC236}">
+                          <a16:creationId xmlns:a16="http://schemas.microsoft.com/office/drawing/2014/main" id="{FA655580-BFB5-0F51-4AAE-25BC208776ED}"/>
+                        </a:ext>
+                      </a:extLst>
+                    </p:cNvPr>
+                    <p:cNvSpPr/>
+                    <p:nvPr/>
+                  </p:nvSpPr>
+                  <p:spPr>
+                    <a:xfrm rot="5400000">
+                      <a:off x="5966450" y="1712307"/>
+                      <a:ext cx="665704" cy="517793"/>
+                    </a:xfrm>
+                    <a:prstGeom prst="flowChartDelay">
+                      <a:avLst/>
+                    </a:prstGeom>
+                    <a:grpFill/>
+                    <a:ln>
+                      <a:solidFill>
+                        <a:schemeClr val="bg1"/>
+                      </a:solidFill>
+                    </a:ln>
+                  </p:spPr>
+                  <p:style>
+                    <a:lnRef idx="2">
+                      <a:schemeClr val="accent1">
+                        <a:shade val="50000"/>
+                      </a:schemeClr>
+                    </a:lnRef>
+                    <a:fillRef idx="1">
+                      <a:schemeClr val="accent1"/>
+                    </a:fillRef>
+                    <a:effectRef idx="0">
+                      <a:schemeClr val="accent1"/>
+                    </a:effectRef>
+                    <a:fontRef idx="minor">
+                      <a:schemeClr val="lt1"/>
+                    </a:fontRef>
+                  </p:style>
+                  <p:txBody>
+                    <a:bodyPr rtlCol="0" anchor="ctr"/>
+                    <a:lstStyle/>
+                    <a:p>
+                      <a:pPr algn="ctr"/>
+                      <a:endParaRPr lang="fr-FR"/>
+                    </a:p>
+                  </p:txBody>
+                </p:sp>
+              </p:grpSp>
+            </p:grpSp>
+          </p:grpSp>
+          <p:grpSp>
+            <p:nvGrpSpPr>
+              <p:cNvPr id="103" name="Groupe 102">
+                <a:extLst>
+                  <a:ext uri="{FF2B5EF4-FFF2-40B4-BE49-F238E27FC236}">
+                    <a16:creationId xmlns:a16="http://schemas.microsoft.com/office/drawing/2014/main" id="{AC6A0F6D-CB66-62CB-C840-803163F4278B}"/>
+                  </a:ext>
+                </a:extLst>
+              </p:cNvPr>
+              <p:cNvGrpSpPr/>
+              <p:nvPr/>
+            </p:nvGrpSpPr>
+            <p:grpSpPr>
+              <a:xfrm>
+                <a:off x="4855375" y="861229"/>
+                <a:ext cx="2102489" cy="866804"/>
+                <a:chOff x="2375863" y="1835310"/>
+                <a:chExt cx="3590587" cy="2100408"/>
+              </a:xfrm>
+            </p:grpSpPr>
+            <p:sp>
+              <p:nvSpPr>
+                <p:cNvPr id="171" name="Forme libre 170">
+                  <a:extLst>
+                    <a:ext uri="{FF2B5EF4-FFF2-40B4-BE49-F238E27FC236}">
+                      <a16:creationId xmlns:a16="http://schemas.microsoft.com/office/drawing/2014/main" id="{9557464A-8913-659B-AD39-D67BF7DE6DBD}"/>
+                    </a:ext>
+                  </a:extLst>
+                </p:cNvPr>
+                <p:cNvSpPr/>
+                <p:nvPr/>
+              </p:nvSpPr>
+              <p:spPr>
+                <a:xfrm>
+                  <a:off x="2375863" y="1835310"/>
+                  <a:ext cx="3590587" cy="2100408"/>
+                </a:xfrm>
+                <a:custGeom>
+                  <a:avLst/>
+                  <a:gdLst>
+                    <a:gd name="connsiteX0" fmla="*/ 642759 w 3590587"/>
+                    <a:gd name="connsiteY0" fmla="*/ 2064661 h 2100408"/>
+                    <a:gd name="connsiteX1" fmla="*/ 2879183 w 3590587"/>
+                    <a:gd name="connsiteY1" fmla="*/ 2053644 h 2100408"/>
+                    <a:gd name="connsiteX2" fmla="*/ 3562229 w 3590587"/>
+                    <a:gd name="connsiteY2" fmla="*/ 1557885 h 2100408"/>
+                    <a:gd name="connsiteX3" fmla="*/ 3396976 w 3590587"/>
+                    <a:gd name="connsiteY3" fmla="*/ 720603 h 2100408"/>
+                    <a:gd name="connsiteX4" fmla="*/ 2813082 w 3590587"/>
+                    <a:gd name="connsiteY4" fmla="*/ 213827 h 2100408"/>
+                    <a:gd name="connsiteX5" fmla="*/ 1535125 w 3590587"/>
+                    <a:gd name="connsiteY5" fmla="*/ 4507 h 2100408"/>
+                    <a:gd name="connsiteX6" fmla="*/ 532590 w 3590587"/>
+                    <a:gd name="connsiteY6" fmla="*/ 390097 h 2100408"/>
+                    <a:gd name="connsiteX7" fmla="*/ 36831 w 3590587"/>
+                    <a:gd name="connsiteY7" fmla="*/ 1139244 h 2100408"/>
+                    <a:gd name="connsiteX8" fmla="*/ 102932 w 3590587"/>
+                    <a:gd name="connsiteY8" fmla="*/ 1921442 h 2100408"/>
+                    <a:gd name="connsiteX9" fmla="*/ 642759 w 3590587"/>
+                    <a:gd name="connsiteY9" fmla="*/ 2064661 h 2100408"/>
+                  </a:gdLst>
+                  <a:ahLst/>
+                  <a:cxnLst>
+                    <a:cxn ang="0">
+                      <a:pos x="connsiteX0" y="connsiteY0"/>
+                    </a:cxn>
+                    <a:cxn ang="0">
+                      <a:pos x="connsiteX1" y="connsiteY1"/>
+                    </a:cxn>
+                    <a:cxn ang="0">
+                      <a:pos x="connsiteX2" y="connsiteY2"/>
+                    </a:cxn>
+                    <a:cxn ang="0">
+                      <a:pos x="connsiteX3" y="connsiteY3"/>
+                    </a:cxn>
+                    <a:cxn ang="0">
+                      <a:pos x="connsiteX4" y="connsiteY4"/>
+                    </a:cxn>
+                    <a:cxn ang="0">
+                      <a:pos x="connsiteX5" y="connsiteY5"/>
+                    </a:cxn>
+                    <a:cxn ang="0">
+                      <a:pos x="connsiteX6" y="connsiteY6"/>
+                    </a:cxn>
+                    <a:cxn ang="0">
+                      <a:pos x="connsiteX7" y="connsiteY7"/>
+                    </a:cxn>
+                    <a:cxn ang="0">
+                      <a:pos x="connsiteX8" y="connsiteY8"/>
+                    </a:cxn>
+                    <a:cxn ang="0">
+                      <a:pos x="connsiteX9" y="connsiteY9"/>
+                    </a:cxn>
+                  </a:cxnLst>
+                  <a:rect l="l" t="t" r="r" b="b"/>
+                  <a:pathLst>
+                    <a:path w="3590587" h="2100408">
+                      <a:moveTo>
+                        <a:pt x="642759" y="2064661"/>
+                      </a:moveTo>
+                      <a:cubicBezTo>
+                        <a:pt x="1105467" y="2086695"/>
+                        <a:pt x="2392605" y="2138107"/>
+                        <a:pt x="2879183" y="2053644"/>
+                      </a:cubicBezTo>
+                      <a:cubicBezTo>
+                        <a:pt x="3365761" y="1969181"/>
+                        <a:pt x="3475930" y="1780058"/>
+                        <a:pt x="3562229" y="1557885"/>
+                      </a:cubicBezTo>
+                      <a:cubicBezTo>
+                        <a:pt x="3648528" y="1335712"/>
+                        <a:pt x="3521834" y="944613"/>
+                        <a:pt x="3396976" y="720603"/>
+                      </a:cubicBezTo>
+                      <a:cubicBezTo>
+                        <a:pt x="3272118" y="496593"/>
+                        <a:pt x="3123391" y="333176"/>
+                        <a:pt x="2813082" y="213827"/>
+                      </a:cubicBezTo>
+                      <a:cubicBezTo>
+                        <a:pt x="2502774" y="94478"/>
+                        <a:pt x="1915207" y="-24871"/>
+                        <a:pt x="1535125" y="4507"/>
+                      </a:cubicBezTo>
+                      <a:cubicBezTo>
+                        <a:pt x="1155043" y="33885"/>
+                        <a:pt x="782306" y="200974"/>
+                        <a:pt x="532590" y="390097"/>
+                      </a:cubicBezTo>
+                      <a:cubicBezTo>
+                        <a:pt x="282874" y="579220"/>
+                        <a:pt x="108441" y="884020"/>
+                        <a:pt x="36831" y="1139244"/>
+                      </a:cubicBezTo>
+                      <a:cubicBezTo>
+                        <a:pt x="-34779" y="1394468"/>
+                        <a:pt x="3780" y="1767206"/>
+                        <a:pt x="102932" y="1921442"/>
+                      </a:cubicBezTo>
+                      <a:cubicBezTo>
+                        <a:pt x="202084" y="2075678"/>
+                        <a:pt x="180051" y="2042627"/>
+                        <a:pt x="642759" y="2064661"/>
+                      </a:cubicBezTo>
+                      <a:close/>
+                    </a:path>
+                  </a:pathLst>
+                </a:custGeom>
+                <a:solidFill>
+                  <a:srgbClr val="CC000E"/>
+                </a:solidFill>
+                <a:ln>
+                  <a:solidFill>
+                    <a:srgbClr val="CC000E"/>
+                  </a:solidFill>
+                </a:ln>
+              </p:spPr>
+              <p:style>
+                <a:lnRef idx="2">
+                  <a:schemeClr val="accent1">
+                    <a:shade val="50000"/>
+                  </a:schemeClr>
+                </a:lnRef>
+                <a:fillRef idx="1">
+                  <a:schemeClr val="accent1"/>
+                </a:fillRef>
+                <a:effectRef idx="0">
+                  <a:schemeClr val="accent1"/>
+                </a:effectRef>
+                <a:fontRef idx="minor">
+                  <a:schemeClr val="lt1"/>
+                </a:fontRef>
+              </p:style>
+              <p:txBody>
+                <a:bodyPr rtlCol="0" anchor="ctr"/>
+                <a:lstStyle/>
+                <a:p>
+                  <a:pPr algn="ctr"/>
+                  <a:endParaRPr lang="fr-FR"/>
+                </a:p>
+              </p:txBody>
+            </p:sp>
+            <p:grpSp>
+              <p:nvGrpSpPr>
+                <p:cNvPr id="172" name="Groupe 171">
+                  <a:extLst>
+                    <a:ext uri="{FF2B5EF4-FFF2-40B4-BE49-F238E27FC236}">
+                      <a16:creationId xmlns:a16="http://schemas.microsoft.com/office/drawing/2014/main" id="{68E8C557-B698-EBF6-7018-F1AEA1FE1E67}"/>
+                    </a:ext>
+                  </a:extLst>
+                </p:cNvPr>
+                <p:cNvGrpSpPr/>
+                <p:nvPr/>
+              </p:nvGrpSpPr>
+              <p:grpSpPr>
+                <a:xfrm>
+                  <a:off x="5062149" y="2206422"/>
+                  <a:ext cx="327344" cy="657849"/>
+                  <a:chOff x="6040406" y="972647"/>
+                  <a:chExt cx="327344" cy="657849"/>
+                </a:xfrm>
+              </p:grpSpPr>
+              <p:grpSp>
+                <p:nvGrpSpPr>
+                  <p:cNvPr id="180" name="Groupe 179">
+                    <a:extLst>
+                      <a:ext uri="{FF2B5EF4-FFF2-40B4-BE49-F238E27FC236}">
+                        <a16:creationId xmlns:a16="http://schemas.microsoft.com/office/drawing/2014/main" id="{A5E17592-55A3-00DA-A38F-0B2F9CA7F53A}"/>
+                      </a:ext>
+                    </a:extLst>
+                  </p:cNvPr>
+                  <p:cNvGrpSpPr/>
+                  <p:nvPr/>
+                </p:nvGrpSpPr>
+                <p:grpSpPr>
+                  <a:xfrm>
+                    <a:off x="6040406" y="972647"/>
+                    <a:ext cx="327344" cy="657849"/>
+                    <a:chOff x="6040405" y="972647"/>
+                    <a:chExt cx="517793" cy="1331409"/>
+                  </a:xfrm>
+                </p:grpSpPr>
+                <p:sp>
+                  <p:nvSpPr>
+                    <p:cNvPr id="184" name="Délai  183">
+                      <a:extLst>
+                        <a:ext uri="{FF2B5EF4-FFF2-40B4-BE49-F238E27FC236}">
+                          <a16:creationId xmlns:a16="http://schemas.microsoft.com/office/drawing/2014/main" id="{91417D44-9A32-4695-FF19-FD313A9CBE82}"/>
+                        </a:ext>
+                      </a:extLst>
+                    </p:cNvPr>
+                    <p:cNvSpPr/>
+                    <p:nvPr/>
+                  </p:nvSpPr>
+                  <p:spPr>
+                    <a:xfrm rot="16200000">
+                      <a:off x="5966450" y="1046602"/>
+                      <a:ext cx="665704" cy="517793"/>
+                    </a:xfrm>
+                    <a:prstGeom prst="flowChartDelay">
+                      <a:avLst/>
+                    </a:prstGeom>
+                    <a:solidFill>
+                      <a:schemeClr val="tx1"/>
+                    </a:solidFill>
+                    <a:ln>
+                      <a:solidFill>
+                        <a:schemeClr val="tx1"/>
+                      </a:solidFill>
+                    </a:ln>
+                  </p:spPr>
+                  <p:style>
+                    <a:lnRef idx="2">
+                      <a:schemeClr val="accent1">
+                        <a:shade val="50000"/>
+                      </a:schemeClr>
+                    </a:lnRef>
+                    <a:fillRef idx="1">
+                      <a:schemeClr val="accent1"/>
+                    </a:fillRef>
+                    <a:effectRef idx="0">
+                      <a:schemeClr val="accent1"/>
+                    </a:effectRef>
+                    <a:fontRef idx="minor">
+                      <a:schemeClr val="lt1"/>
+                    </a:fontRef>
+                  </p:style>
+                  <p:txBody>
+                    <a:bodyPr rtlCol="0" anchor="ctr"/>
+                    <a:lstStyle/>
+                    <a:p>
+                      <a:pPr algn="ctr"/>
+                      <a:endParaRPr lang="fr-FR"/>
+                    </a:p>
+                  </p:txBody>
+                </p:sp>
+                <p:sp>
+                  <p:nvSpPr>
+                    <p:cNvPr id="185" name="Délai  184">
+                      <a:extLst>
+                        <a:ext uri="{FF2B5EF4-FFF2-40B4-BE49-F238E27FC236}">
+                          <a16:creationId xmlns:a16="http://schemas.microsoft.com/office/drawing/2014/main" id="{CB7DD489-11E0-F2BE-A07A-A81629B13EF7}"/>
+                        </a:ext>
+                      </a:extLst>
+                    </p:cNvPr>
+                    <p:cNvSpPr/>
+                    <p:nvPr/>
+                  </p:nvSpPr>
+                  <p:spPr>
+                    <a:xfrm rot="5400000">
+                      <a:off x="5966450" y="1712307"/>
+                      <a:ext cx="665704" cy="517793"/>
+                    </a:xfrm>
+                    <a:prstGeom prst="flowChartDelay">
+                      <a:avLst/>
+                    </a:prstGeom>
+                    <a:solidFill>
+                      <a:schemeClr val="tx1"/>
+                    </a:solidFill>
+                    <a:ln>
+                      <a:solidFill>
+                        <a:schemeClr val="tx1"/>
+                      </a:solidFill>
+                    </a:ln>
+                  </p:spPr>
+                  <p:style>
+                    <a:lnRef idx="2">
+                      <a:schemeClr val="accent1">
+                        <a:shade val="50000"/>
+                      </a:schemeClr>
+                    </a:lnRef>
+                    <a:fillRef idx="1">
+                      <a:schemeClr val="accent1"/>
+                    </a:fillRef>
+                    <a:effectRef idx="0">
+                      <a:schemeClr val="accent1"/>
+                    </a:effectRef>
+                    <a:fontRef idx="minor">
+                      <a:schemeClr val="lt1"/>
+                    </a:fontRef>
+                  </p:style>
+                  <p:txBody>
+                    <a:bodyPr rtlCol="0" anchor="ctr"/>
+                    <a:lstStyle/>
+                    <a:p>
+                      <a:pPr algn="ctr"/>
+                      <a:endParaRPr lang="fr-FR"/>
+                    </a:p>
+                  </p:txBody>
+                </p:sp>
+              </p:grpSp>
+              <p:grpSp>
+                <p:nvGrpSpPr>
+                  <p:cNvPr id="181" name="Groupe 180">
+                    <a:extLst>
+                      <a:ext uri="{FF2B5EF4-FFF2-40B4-BE49-F238E27FC236}">
+                        <a16:creationId xmlns:a16="http://schemas.microsoft.com/office/drawing/2014/main" id="{883B8041-56CE-3016-A686-48F5F06C243F}"/>
+                      </a:ext>
+                    </a:extLst>
+                  </p:cNvPr>
+                  <p:cNvGrpSpPr/>
+                  <p:nvPr/>
+                </p:nvGrpSpPr>
+                <p:grpSpPr>
+                  <a:xfrm>
+                    <a:off x="6204078" y="1061572"/>
+                    <a:ext cx="55594" cy="328925"/>
+                    <a:chOff x="6040405" y="972647"/>
+                    <a:chExt cx="517793" cy="1331409"/>
+                  </a:xfrm>
+                  <a:solidFill>
+                    <a:schemeClr val="bg1"/>
+                  </a:solidFill>
+                </p:grpSpPr>
+                <p:sp>
+                  <p:nvSpPr>
+                    <p:cNvPr id="182" name="Délai  181">
+                      <a:extLst>
+                        <a:ext uri="{FF2B5EF4-FFF2-40B4-BE49-F238E27FC236}">
+                          <a16:creationId xmlns:a16="http://schemas.microsoft.com/office/drawing/2014/main" id="{024473AF-7286-4D99-90EF-1BD9782CF783}"/>
+                        </a:ext>
+                      </a:extLst>
+                    </p:cNvPr>
+                    <p:cNvSpPr/>
+                    <p:nvPr/>
+                  </p:nvSpPr>
+                  <p:spPr>
+                    <a:xfrm rot="16200000">
+                      <a:off x="5966450" y="1046602"/>
+                      <a:ext cx="665704" cy="517793"/>
+                    </a:xfrm>
+                    <a:prstGeom prst="flowChartDelay">
+                      <a:avLst/>
+                    </a:prstGeom>
+                    <a:grpFill/>
+                    <a:ln>
+                      <a:solidFill>
+                        <a:schemeClr val="bg1"/>
+                      </a:solidFill>
+                    </a:ln>
+                  </p:spPr>
+                  <p:style>
+                    <a:lnRef idx="2">
+                      <a:schemeClr val="accent1">
+                        <a:shade val="50000"/>
+                      </a:schemeClr>
+                    </a:lnRef>
+                    <a:fillRef idx="1">
+                      <a:schemeClr val="accent1"/>
+                    </a:fillRef>
+                    <a:effectRef idx="0">
+                      <a:schemeClr val="accent1"/>
+                    </a:effectRef>
+                    <a:fontRef idx="minor">
+                      <a:schemeClr val="lt1"/>
+                    </a:fontRef>
+                  </p:style>
+                  <p:txBody>
+                    <a:bodyPr rtlCol="0" anchor="ctr"/>
+                    <a:lstStyle/>
+                    <a:p>
+                      <a:pPr algn="ctr"/>
+                      <a:endParaRPr lang="fr-FR"/>
+                    </a:p>
+                  </p:txBody>
+                </p:sp>
+                <p:sp>
+                  <p:nvSpPr>
+                    <p:cNvPr id="183" name="Délai  182">
+                      <a:extLst>
+                        <a:ext uri="{FF2B5EF4-FFF2-40B4-BE49-F238E27FC236}">
+                          <a16:creationId xmlns:a16="http://schemas.microsoft.com/office/drawing/2014/main" id="{10881F10-3B56-C081-8BDD-64D2800CCE75}"/>
+                        </a:ext>
+                      </a:extLst>
+                    </p:cNvPr>
+                    <p:cNvSpPr/>
+                    <p:nvPr/>
+                  </p:nvSpPr>
+                  <p:spPr>
+                    <a:xfrm rot="5400000">
+                      <a:off x="5966450" y="1712307"/>
+                      <a:ext cx="665704" cy="517793"/>
+                    </a:xfrm>
+                    <a:prstGeom prst="flowChartDelay">
+                      <a:avLst/>
+                    </a:prstGeom>
+                    <a:grpFill/>
+                    <a:ln>
+                      <a:solidFill>
+                        <a:schemeClr val="bg1"/>
+                      </a:solidFill>
+                    </a:ln>
+                  </p:spPr>
+                  <p:style>
+                    <a:lnRef idx="2">
+                      <a:schemeClr val="accent1">
+                        <a:shade val="50000"/>
+                      </a:schemeClr>
+                    </a:lnRef>
+                    <a:fillRef idx="1">
+                      <a:schemeClr val="accent1"/>
+                    </a:fillRef>
+                    <a:effectRef idx="0">
+                      <a:schemeClr val="accent1"/>
+                    </a:effectRef>
+                    <a:fontRef idx="minor">
+                      <a:schemeClr val="lt1"/>
+                    </a:fontRef>
+                  </p:style>
+                  <p:txBody>
+                    <a:bodyPr rtlCol="0" anchor="ctr"/>
+                    <a:lstStyle/>
+                    <a:p>
+                      <a:pPr algn="ctr"/>
+                      <a:endParaRPr lang="fr-FR"/>
+                    </a:p>
+                  </p:txBody>
+                </p:sp>
+              </p:grpSp>
+            </p:grpSp>
+            <p:grpSp>
+              <p:nvGrpSpPr>
+                <p:cNvPr id="173" name="Groupe 172">
+                  <a:extLst>
+                    <a:ext uri="{FF2B5EF4-FFF2-40B4-BE49-F238E27FC236}">
+                      <a16:creationId xmlns:a16="http://schemas.microsoft.com/office/drawing/2014/main" id="{D1E42B11-BF59-67EA-46EF-985F06D79CEE}"/>
+                    </a:ext>
+                  </a:extLst>
+                </p:cNvPr>
+                <p:cNvGrpSpPr/>
+                <p:nvPr/>
+              </p:nvGrpSpPr>
+              <p:grpSpPr>
+                <a:xfrm>
+                  <a:off x="4485192" y="2206422"/>
+                  <a:ext cx="327344" cy="657849"/>
+                  <a:chOff x="6040406" y="972647"/>
+                  <a:chExt cx="327344" cy="657849"/>
+                </a:xfrm>
+              </p:grpSpPr>
+              <p:grpSp>
+                <p:nvGrpSpPr>
+                  <p:cNvPr id="174" name="Groupe 173">
+                    <a:extLst>
+                      <a:ext uri="{FF2B5EF4-FFF2-40B4-BE49-F238E27FC236}">
+                        <a16:creationId xmlns:a16="http://schemas.microsoft.com/office/drawing/2014/main" id="{825D8D34-379D-4002-B8C1-57CE87F265A1}"/>
+                      </a:ext>
+                    </a:extLst>
+                  </p:cNvPr>
+                  <p:cNvGrpSpPr/>
+                  <p:nvPr/>
+                </p:nvGrpSpPr>
+                <p:grpSpPr>
+                  <a:xfrm>
+                    <a:off x="6040406" y="972647"/>
+                    <a:ext cx="327344" cy="657849"/>
+                    <a:chOff x="6040405" y="972647"/>
+                    <a:chExt cx="517793" cy="1331409"/>
+                  </a:xfrm>
+                </p:grpSpPr>
+                <p:sp>
+                  <p:nvSpPr>
+                    <p:cNvPr id="178" name="Délai  177">
+                      <a:extLst>
+                        <a:ext uri="{FF2B5EF4-FFF2-40B4-BE49-F238E27FC236}">
+                          <a16:creationId xmlns:a16="http://schemas.microsoft.com/office/drawing/2014/main" id="{2B972A7E-BB0E-5CB4-8C3E-DFD14FF25AEC}"/>
+                        </a:ext>
+                      </a:extLst>
+                    </p:cNvPr>
+                    <p:cNvSpPr/>
+                    <p:nvPr/>
+                  </p:nvSpPr>
+                  <p:spPr>
+                    <a:xfrm rot="16200000">
+                      <a:off x="5966450" y="1046602"/>
+                      <a:ext cx="665704" cy="517793"/>
+                    </a:xfrm>
+                    <a:prstGeom prst="flowChartDelay">
+                      <a:avLst/>
+                    </a:prstGeom>
+                    <a:solidFill>
+                      <a:schemeClr val="tx1"/>
+                    </a:solidFill>
+                    <a:ln>
+                      <a:solidFill>
+                        <a:schemeClr val="tx1"/>
+                      </a:solidFill>
+                    </a:ln>
+                  </p:spPr>
+                  <p:style>
+                    <a:lnRef idx="2">
+                      <a:schemeClr val="accent1">
+                        <a:shade val="50000"/>
+                      </a:schemeClr>
+                    </a:lnRef>
+                    <a:fillRef idx="1">
+                      <a:schemeClr val="accent1"/>
+                    </a:fillRef>
+                    <a:effectRef idx="0">
+                      <a:schemeClr val="accent1"/>
+                    </a:effectRef>
+                    <a:fontRef idx="minor">
+                      <a:schemeClr val="lt1"/>
+                    </a:fontRef>
+                  </p:style>
+                  <p:txBody>
+                    <a:bodyPr rtlCol="0" anchor="ctr"/>
+                    <a:lstStyle/>
+                    <a:p>
+                      <a:pPr algn="ctr"/>
+                      <a:endParaRPr lang="fr-FR"/>
+                    </a:p>
+                  </p:txBody>
+                </p:sp>
+                <p:sp>
+                  <p:nvSpPr>
+                    <p:cNvPr id="179" name="Délai  178">
+                      <a:extLst>
+                        <a:ext uri="{FF2B5EF4-FFF2-40B4-BE49-F238E27FC236}">
+                          <a16:creationId xmlns:a16="http://schemas.microsoft.com/office/drawing/2014/main" id="{ECC749CB-558B-8B73-06C6-9A66BCADA59D}"/>
+                        </a:ext>
+                      </a:extLst>
+                    </p:cNvPr>
+                    <p:cNvSpPr/>
+                    <p:nvPr/>
+                  </p:nvSpPr>
+                  <p:spPr>
+                    <a:xfrm rot="5400000">
+                      <a:off x="5966450" y="1712307"/>
+                      <a:ext cx="665704" cy="517793"/>
+                    </a:xfrm>
+                    <a:prstGeom prst="flowChartDelay">
+                      <a:avLst/>
+                    </a:prstGeom>
+                    <a:solidFill>
+                      <a:schemeClr val="tx1"/>
+                    </a:solidFill>
+                    <a:ln>
+                      <a:solidFill>
+                        <a:schemeClr val="tx1"/>
+                      </a:solidFill>
+                    </a:ln>
+                  </p:spPr>
+                  <p:style>
+                    <a:lnRef idx="2">
+                      <a:schemeClr val="accent1">
+                        <a:shade val="50000"/>
+                      </a:schemeClr>
+                    </a:lnRef>
+                    <a:fillRef idx="1">
+                      <a:schemeClr val="accent1"/>
+                    </a:fillRef>
+                    <a:effectRef idx="0">
+                      <a:schemeClr val="accent1"/>
+                    </a:effectRef>
+                    <a:fontRef idx="minor">
+                      <a:schemeClr val="lt1"/>
+                    </a:fontRef>
+                  </p:style>
+                  <p:txBody>
+                    <a:bodyPr rtlCol="0" anchor="ctr"/>
+                    <a:lstStyle/>
+                    <a:p>
+                      <a:pPr algn="ctr"/>
+                      <a:endParaRPr lang="fr-FR"/>
+                    </a:p>
+                  </p:txBody>
+                </p:sp>
+              </p:grpSp>
+              <p:grpSp>
+                <p:nvGrpSpPr>
+                  <p:cNvPr id="175" name="Groupe 174">
+                    <a:extLst>
+                      <a:ext uri="{FF2B5EF4-FFF2-40B4-BE49-F238E27FC236}">
+                        <a16:creationId xmlns:a16="http://schemas.microsoft.com/office/drawing/2014/main" id="{ABC03168-78CD-202A-1C27-CDA02F5A0FB0}"/>
+                      </a:ext>
+                    </a:extLst>
+                  </p:cNvPr>
+                  <p:cNvGrpSpPr/>
+                  <p:nvPr/>
+                </p:nvGrpSpPr>
+                <p:grpSpPr>
+                  <a:xfrm>
+                    <a:off x="6204078" y="1061572"/>
+                    <a:ext cx="55594" cy="328925"/>
+                    <a:chOff x="6040405" y="972647"/>
+                    <a:chExt cx="517793" cy="1331409"/>
+                  </a:xfrm>
+                  <a:solidFill>
+                    <a:schemeClr val="bg1"/>
+                  </a:solidFill>
+                </p:grpSpPr>
+                <p:sp>
+                  <p:nvSpPr>
+                    <p:cNvPr id="176" name="Délai  175">
+                      <a:extLst>
+                        <a:ext uri="{FF2B5EF4-FFF2-40B4-BE49-F238E27FC236}">
+                          <a16:creationId xmlns:a16="http://schemas.microsoft.com/office/drawing/2014/main" id="{0C323C02-F3BB-778C-AFAB-F58C044C9A37}"/>
+                        </a:ext>
+                      </a:extLst>
+                    </p:cNvPr>
+                    <p:cNvSpPr/>
+                    <p:nvPr/>
+                  </p:nvSpPr>
+                  <p:spPr>
+                    <a:xfrm rot="16200000">
+                      <a:off x="5966450" y="1046602"/>
+                      <a:ext cx="665704" cy="517793"/>
+                    </a:xfrm>
+                    <a:prstGeom prst="flowChartDelay">
+                      <a:avLst/>
+                    </a:prstGeom>
+                    <a:grpFill/>
+                    <a:ln>
+                      <a:solidFill>
+                        <a:schemeClr val="bg1"/>
+                      </a:solidFill>
+                    </a:ln>
+                  </p:spPr>
+                  <p:style>
+                    <a:lnRef idx="2">
+                      <a:schemeClr val="accent1">
+                        <a:shade val="50000"/>
+                      </a:schemeClr>
+                    </a:lnRef>
+                    <a:fillRef idx="1">
+                      <a:schemeClr val="accent1"/>
+                    </a:fillRef>
+                    <a:effectRef idx="0">
+                      <a:schemeClr val="accent1"/>
+                    </a:effectRef>
+                    <a:fontRef idx="minor">
+                      <a:schemeClr val="lt1"/>
+                    </a:fontRef>
+                  </p:style>
+                  <p:txBody>
+                    <a:bodyPr rtlCol="0" anchor="ctr"/>
+                    <a:lstStyle/>
+                    <a:p>
+                      <a:pPr algn="ctr"/>
+                      <a:endParaRPr lang="fr-FR"/>
+                    </a:p>
+                  </p:txBody>
+                </p:sp>
+                <p:sp>
+                  <p:nvSpPr>
+                    <p:cNvPr id="177" name="Délai  176">
+                      <a:extLst>
+                        <a:ext uri="{FF2B5EF4-FFF2-40B4-BE49-F238E27FC236}">
+                          <a16:creationId xmlns:a16="http://schemas.microsoft.com/office/drawing/2014/main" id="{7A4E6CEC-2E8B-E835-0214-241F3D5437A2}"/>
+                        </a:ext>
+                      </a:extLst>
+                    </p:cNvPr>
+                    <p:cNvSpPr/>
+                    <p:nvPr/>
+                  </p:nvSpPr>
+                  <p:spPr>
+                    <a:xfrm rot="5400000">
+                      <a:off x="5966450" y="1712307"/>
+                      <a:ext cx="665704" cy="517793"/>
+                    </a:xfrm>
+                    <a:prstGeom prst="flowChartDelay">
+                      <a:avLst/>
+                    </a:prstGeom>
+                    <a:grpFill/>
+                    <a:ln>
+                      <a:solidFill>
+                        <a:schemeClr val="bg1"/>
+                      </a:solidFill>
+                    </a:ln>
+                  </p:spPr>
+                  <p:style>
+                    <a:lnRef idx="2">
+                      <a:schemeClr val="accent1">
+                        <a:shade val="50000"/>
+                      </a:schemeClr>
+                    </a:lnRef>
+                    <a:fillRef idx="1">
+                      <a:schemeClr val="accent1"/>
+                    </a:fillRef>
+                    <a:effectRef idx="0">
+                      <a:schemeClr val="accent1"/>
+                    </a:effectRef>
+                    <a:fontRef idx="minor">
+                      <a:schemeClr val="lt1"/>
+                    </a:fontRef>
+                  </p:style>
+                  <p:txBody>
+                    <a:bodyPr rtlCol="0" anchor="ctr"/>
+                    <a:lstStyle/>
+                    <a:p>
+                      <a:pPr algn="ctr"/>
+                      <a:endParaRPr lang="fr-FR"/>
+                    </a:p>
+                  </p:txBody>
+                </p:sp>
+              </p:grpSp>
+            </p:grpSp>
+          </p:grpSp>
+          <p:grpSp>
+            <p:nvGrpSpPr>
+              <p:cNvPr id="104" name="Groupe 103">
+                <a:extLst>
+                  <a:ext uri="{FF2B5EF4-FFF2-40B4-BE49-F238E27FC236}">
+                    <a16:creationId xmlns:a16="http://schemas.microsoft.com/office/drawing/2014/main" id="{4129211E-F9C4-4B07-4732-473A524FEB3C}"/>
+                  </a:ext>
+                </a:extLst>
+              </p:cNvPr>
+              <p:cNvGrpSpPr/>
+              <p:nvPr/>
+            </p:nvGrpSpPr>
+            <p:grpSpPr>
+              <a:xfrm>
+                <a:off x="2519441" y="561859"/>
+                <a:ext cx="2102489" cy="1153557"/>
+                <a:chOff x="2375863" y="1835310"/>
+                <a:chExt cx="3590587" cy="2100408"/>
+              </a:xfrm>
+            </p:grpSpPr>
+            <p:sp>
+              <p:nvSpPr>
+                <p:cNvPr id="105" name="Forme libre 104">
+                  <a:extLst>
+                    <a:ext uri="{FF2B5EF4-FFF2-40B4-BE49-F238E27FC236}">
+                      <a16:creationId xmlns:a16="http://schemas.microsoft.com/office/drawing/2014/main" id="{45B491D1-FF72-92B6-55A9-F19D4EDC5B51}"/>
+                    </a:ext>
+                  </a:extLst>
+                </p:cNvPr>
+                <p:cNvSpPr/>
+                <p:nvPr/>
+              </p:nvSpPr>
+              <p:spPr>
+                <a:xfrm>
+                  <a:off x="2375863" y="1835310"/>
+                  <a:ext cx="3590587" cy="2100408"/>
+                </a:xfrm>
+                <a:custGeom>
+                  <a:avLst/>
+                  <a:gdLst>
+                    <a:gd name="connsiteX0" fmla="*/ 642759 w 3590587"/>
+                    <a:gd name="connsiteY0" fmla="*/ 2064661 h 2100408"/>
+                    <a:gd name="connsiteX1" fmla="*/ 2879183 w 3590587"/>
+                    <a:gd name="connsiteY1" fmla="*/ 2053644 h 2100408"/>
+                    <a:gd name="connsiteX2" fmla="*/ 3562229 w 3590587"/>
+                    <a:gd name="connsiteY2" fmla="*/ 1557885 h 2100408"/>
+                    <a:gd name="connsiteX3" fmla="*/ 3396976 w 3590587"/>
+                    <a:gd name="connsiteY3" fmla="*/ 720603 h 2100408"/>
+                    <a:gd name="connsiteX4" fmla="*/ 2813082 w 3590587"/>
+                    <a:gd name="connsiteY4" fmla="*/ 213827 h 2100408"/>
+                    <a:gd name="connsiteX5" fmla="*/ 1535125 w 3590587"/>
+                    <a:gd name="connsiteY5" fmla="*/ 4507 h 2100408"/>
+                    <a:gd name="connsiteX6" fmla="*/ 532590 w 3590587"/>
+                    <a:gd name="connsiteY6" fmla="*/ 390097 h 2100408"/>
+                    <a:gd name="connsiteX7" fmla="*/ 36831 w 3590587"/>
+                    <a:gd name="connsiteY7" fmla="*/ 1139244 h 2100408"/>
+                    <a:gd name="connsiteX8" fmla="*/ 102932 w 3590587"/>
+                    <a:gd name="connsiteY8" fmla="*/ 1921442 h 2100408"/>
+                    <a:gd name="connsiteX9" fmla="*/ 642759 w 3590587"/>
+                    <a:gd name="connsiteY9" fmla="*/ 2064661 h 2100408"/>
+                  </a:gdLst>
+                  <a:ahLst/>
+                  <a:cxnLst>
+                    <a:cxn ang="0">
+                      <a:pos x="connsiteX0" y="connsiteY0"/>
+                    </a:cxn>
+                    <a:cxn ang="0">
+                      <a:pos x="connsiteX1" y="connsiteY1"/>
+                    </a:cxn>
+                    <a:cxn ang="0">
+                      <a:pos x="connsiteX2" y="connsiteY2"/>
+                    </a:cxn>
+                    <a:cxn ang="0">
+                      <a:pos x="connsiteX3" y="connsiteY3"/>
+                    </a:cxn>
+                    <a:cxn ang="0">
+                      <a:pos x="connsiteX4" y="connsiteY4"/>
+                    </a:cxn>
+                    <a:cxn ang="0">
+                      <a:pos x="connsiteX5" y="connsiteY5"/>
+                    </a:cxn>
+                    <a:cxn ang="0">
+                      <a:pos x="connsiteX6" y="connsiteY6"/>
+                    </a:cxn>
+                    <a:cxn ang="0">
+                      <a:pos x="connsiteX7" y="connsiteY7"/>
+                    </a:cxn>
+                    <a:cxn ang="0">
+                      <a:pos x="connsiteX8" y="connsiteY8"/>
+                    </a:cxn>
+                    <a:cxn ang="0">
+                      <a:pos x="connsiteX9" y="connsiteY9"/>
+                    </a:cxn>
+                  </a:cxnLst>
+                  <a:rect l="l" t="t" r="r" b="b"/>
+                  <a:pathLst>
+                    <a:path w="3590587" h="2100408">
+                      <a:moveTo>
+                        <a:pt x="642759" y="2064661"/>
+                      </a:moveTo>
+                      <a:cubicBezTo>
+                        <a:pt x="1105467" y="2086695"/>
+                        <a:pt x="2392605" y="2138107"/>
+                        <a:pt x="2879183" y="2053644"/>
+                      </a:cubicBezTo>
+                      <a:cubicBezTo>
+                        <a:pt x="3365761" y="1969181"/>
+                        <a:pt x="3475930" y="1780058"/>
+                        <a:pt x="3562229" y="1557885"/>
+                      </a:cubicBezTo>
+                      <a:cubicBezTo>
+                        <a:pt x="3648528" y="1335712"/>
+                        <a:pt x="3521834" y="944613"/>
+                        <a:pt x="3396976" y="720603"/>
+                      </a:cubicBezTo>
+                      <a:cubicBezTo>
+                        <a:pt x="3272118" y="496593"/>
+                        <a:pt x="3123391" y="333176"/>
+                        <a:pt x="2813082" y="213827"/>
+                      </a:cubicBezTo>
+                      <a:cubicBezTo>
+                        <a:pt x="2502774" y="94478"/>
+                        <a:pt x="1915207" y="-24871"/>
+                        <a:pt x="1535125" y="4507"/>
+                      </a:cubicBezTo>
+                      <a:cubicBezTo>
+                        <a:pt x="1155043" y="33885"/>
+                        <a:pt x="782306" y="200974"/>
+                        <a:pt x="532590" y="390097"/>
+                      </a:cubicBezTo>
+                      <a:cubicBezTo>
+                        <a:pt x="282874" y="579220"/>
+                        <a:pt x="108441" y="884020"/>
+                        <a:pt x="36831" y="1139244"/>
+                      </a:cubicBezTo>
+                      <a:cubicBezTo>
+                        <a:pt x="-34779" y="1394468"/>
+                        <a:pt x="3780" y="1767206"/>
+                        <a:pt x="102932" y="1921442"/>
+                      </a:cubicBezTo>
+                      <a:cubicBezTo>
+                        <a:pt x="202084" y="2075678"/>
+                        <a:pt x="180051" y="2042627"/>
+                        <a:pt x="642759" y="2064661"/>
+                      </a:cubicBezTo>
+                      <a:close/>
+                    </a:path>
+                  </a:pathLst>
+                </a:custGeom>
+                <a:solidFill>
+                  <a:srgbClr val="CC000E"/>
+                </a:solidFill>
+                <a:ln>
+                  <a:solidFill>
+                    <a:srgbClr val="CC000E"/>
+                  </a:solidFill>
+                </a:ln>
+              </p:spPr>
+              <p:style>
+                <a:lnRef idx="2">
+                  <a:schemeClr val="accent1">
+                    <a:shade val="50000"/>
+                  </a:schemeClr>
+                </a:lnRef>
+                <a:fillRef idx="1">
+                  <a:schemeClr val="accent1"/>
+                </a:fillRef>
+                <a:effectRef idx="0">
+                  <a:schemeClr val="accent1"/>
+                </a:effectRef>
+                <a:fontRef idx="minor">
+                  <a:schemeClr val="lt1"/>
+                </a:fontRef>
+              </p:style>
+              <p:txBody>
+                <a:bodyPr rtlCol="0" anchor="ctr"/>
+                <a:lstStyle/>
+                <a:p>
+                  <a:pPr algn="ctr"/>
+                  <a:endParaRPr lang="fr-FR"/>
+                </a:p>
+              </p:txBody>
+            </p:sp>
+            <p:grpSp>
+              <p:nvGrpSpPr>
+                <p:cNvPr id="106" name="Groupe 105">
+                  <a:extLst>
+                    <a:ext uri="{FF2B5EF4-FFF2-40B4-BE49-F238E27FC236}">
+                      <a16:creationId xmlns:a16="http://schemas.microsoft.com/office/drawing/2014/main" id="{F17A4944-8920-0F81-A909-418886BF678F}"/>
+                    </a:ext>
+                  </a:extLst>
+                </p:cNvPr>
+                <p:cNvGrpSpPr/>
+                <p:nvPr/>
+              </p:nvGrpSpPr>
+              <p:grpSpPr>
+                <a:xfrm>
+                  <a:off x="5062149" y="2206422"/>
+                  <a:ext cx="327344" cy="657849"/>
+                  <a:chOff x="6040406" y="972647"/>
+                  <a:chExt cx="327344" cy="657849"/>
+                </a:xfrm>
+              </p:grpSpPr>
+              <p:grpSp>
+                <p:nvGrpSpPr>
+                  <p:cNvPr id="114" name="Groupe 113">
+                    <a:extLst>
+                      <a:ext uri="{FF2B5EF4-FFF2-40B4-BE49-F238E27FC236}">
+                        <a16:creationId xmlns:a16="http://schemas.microsoft.com/office/drawing/2014/main" id="{C2BDE498-8126-A0F6-1971-0D7F377C0C1E}"/>
+                      </a:ext>
+                    </a:extLst>
+                  </p:cNvPr>
+                  <p:cNvGrpSpPr/>
+                  <p:nvPr/>
+                </p:nvGrpSpPr>
+                <p:grpSpPr>
+                  <a:xfrm>
+                    <a:off x="6040406" y="972647"/>
+                    <a:ext cx="327344" cy="657849"/>
+                    <a:chOff x="6040405" y="972647"/>
+                    <a:chExt cx="517793" cy="1331409"/>
+                  </a:xfrm>
+                </p:grpSpPr>
+                <p:sp>
+                  <p:nvSpPr>
+                    <p:cNvPr id="166" name="Délai  165">
+                      <a:extLst>
+                        <a:ext uri="{FF2B5EF4-FFF2-40B4-BE49-F238E27FC236}">
+                          <a16:creationId xmlns:a16="http://schemas.microsoft.com/office/drawing/2014/main" id="{85A82EAD-3F5A-414C-4C96-578AFA9D0F83}"/>
+                        </a:ext>
+                      </a:extLst>
+                    </p:cNvPr>
+                    <p:cNvSpPr/>
+                    <p:nvPr/>
+                  </p:nvSpPr>
+                  <p:spPr>
+                    <a:xfrm rot="16200000">
+                      <a:off x="5966450" y="1046602"/>
+                      <a:ext cx="665704" cy="517793"/>
+                    </a:xfrm>
+                    <a:prstGeom prst="flowChartDelay">
+                      <a:avLst/>
+                    </a:prstGeom>
+                    <a:solidFill>
+                      <a:schemeClr val="tx1"/>
+                    </a:solidFill>
+                    <a:ln>
+                      <a:solidFill>
+                        <a:schemeClr val="tx1"/>
+                      </a:solidFill>
+                    </a:ln>
+                  </p:spPr>
+                  <p:style>
+                    <a:lnRef idx="2">
+                      <a:schemeClr val="accent1">
+                        <a:shade val="50000"/>
+                      </a:schemeClr>
+                    </a:lnRef>
+                    <a:fillRef idx="1">
+                      <a:schemeClr val="accent1"/>
+                    </a:fillRef>
+                    <a:effectRef idx="0">
+                      <a:schemeClr val="accent1"/>
+                    </a:effectRef>
+                    <a:fontRef idx="minor">
+                      <a:schemeClr val="lt1"/>
+                    </a:fontRef>
+                  </p:style>
+                  <p:txBody>
+                    <a:bodyPr rtlCol="0" anchor="ctr"/>
+                    <a:lstStyle/>
+                    <a:p>
+                      <a:pPr algn="ctr"/>
+                      <a:endParaRPr lang="fr-FR"/>
+                    </a:p>
+                  </p:txBody>
+                </p:sp>
+                <p:sp>
+                  <p:nvSpPr>
+                    <p:cNvPr id="170" name="Délai  169">
+                      <a:extLst>
+                        <a:ext uri="{FF2B5EF4-FFF2-40B4-BE49-F238E27FC236}">
+                          <a16:creationId xmlns:a16="http://schemas.microsoft.com/office/drawing/2014/main" id="{4FF0B3CB-F620-BC74-DEE8-AA6D03683FCA}"/>
+                        </a:ext>
+                      </a:extLst>
+                    </p:cNvPr>
+                    <p:cNvSpPr/>
+                    <p:nvPr/>
+                  </p:nvSpPr>
+                  <p:spPr>
+                    <a:xfrm rot="5400000">
+                      <a:off x="5966450" y="1712307"/>
+                      <a:ext cx="665704" cy="517793"/>
+                    </a:xfrm>
+                    <a:prstGeom prst="flowChartDelay">
+                      <a:avLst/>
+                    </a:prstGeom>
+                    <a:solidFill>
+                      <a:schemeClr val="tx1"/>
+                    </a:solidFill>
+                    <a:ln>
+                      <a:solidFill>
+                        <a:schemeClr val="tx1"/>
+                      </a:solidFill>
+                    </a:ln>
+                  </p:spPr>
+                  <p:style>
+                    <a:lnRef idx="2">
+                      <a:schemeClr val="accent1">
+                        <a:shade val="50000"/>
+                      </a:schemeClr>
+                    </a:lnRef>
+                    <a:fillRef idx="1">
+                      <a:schemeClr val="accent1"/>
+                    </a:fillRef>
+                    <a:effectRef idx="0">
+                      <a:schemeClr val="accent1"/>
+                    </a:effectRef>
+                    <a:fontRef idx="minor">
+                      <a:schemeClr val="lt1"/>
+                    </a:fontRef>
+                  </p:style>
+                  <p:txBody>
+                    <a:bodyPr rtlCol="0" anchor="ctr"/>
+                    <a:lstStyle/>
+                    <a:p>
+                      <a:pPr algn="ctr"/>
+                      <a:endParaRPr lang="fr-FR"/>
+                    </a:p>
+                  </p:txBody>
+                </p:sp>
+              </p:grpSp>
+              <p:grpSp>
+                <p:nvGrpSpPr>
+                  <p:cNvPr id="163" name="Groupe 162">
+                    <a:extLst>
+                      <a:ext uri="{FF2B5EF4-FFF2-40B4-BE49-F238E27FC236}">
+                        <a16:creationId xmlns:a16="http://schemas.microsoft.com/office/drawing/2014/main" id="{E858FB73-16EC-8C6E-676D-797D355FA0A6}"/>
+                      </a:ext>
+                    </a:extLst>
+                  </p:cNvPr>
+                  <p:cNvGrpSpPr/>
+                  <p:nvPr/>
+                </p:nvGrpSpPr>
+                <p:grpSpPr>
+                  <a:xfrm>
+                    <a:off x="6204078" y="1061572"/>
+                    <a:ext cx="55594" cy="328925"/>
+                    <a:chOff x="6040405" y="972647"/>
+                    <a:chExt cx="517793" cy="1331409"/>
+                  </a:xfrm>
+                  <a:solidFill>
+                    <a:schemeClr val="bg1"/>
+                  </a:solidFill>
+                </p:grpSpPr>
+                <p:sp>
+                  <p:nvSpPr>
+                    <p:cNvPr id="164" name="Délai  163">
+                      <a:extLst>
+                        <a:ext uri="{FF2B5EF4-FFF2-40B4-BE49-F238E27FC236}">
+                          <a16:creationId xmlns:a16="http://schemas.microsoft.com/office/drawing/2014/main" id="{3BCC4A3A-C770-20F4-0495-11B3B9DAA85C}"/>
+                        </a:ext>
+                      </a:extLst>
+                    </p:cNvPr>
+                    <p:cNvSpPr/>
+                    <p:nvPr/>
+                  </p:nvSpPr>
+                  <p:spPr>
+                    <a:xfrm rot="16200000">
+                      <a:off x="5966450" y="1046602"/>
+                      <a:ext cx="665704" cy="517793"/>
+                    </a:xfrm>
+                    <a:prstGeom prst="flowChartDelay">
+                      <a:avLst/>
+                    </a:prstGeom>
+                    <a:grpFill/>
+                    <a:ln>
+                      <a:solidFill>
+                        <a:schemeClr val="bg1"/>
+                      </a:solidFill>
+                    </a:ln>
+                  </p:spPr>
+                  <p:style>
+                    <a:lnRef idx="2">
+                      <a:schemeClr val="accent1">
+                        <a:shade val="50000"/>
+                      </a:schemeClr>
+                    </a:lnRef>
+                    <a:fillRef idx="1">
+                      <a:schemeClr val="accent1"/>
+                    </a:fillRef>
+                    <a:effectRef idx="0">
+                      <a:schemeClr val="accent1"/>
+                    </a:effectRef>
+                    <a:fontRef idx="minor">
+                      <a:schemeClr val="lt1"/>
+                    </a:fontRef>
+                  </p:style>
+                  <p:txBody>
+                    <a:bodyPr rtlCol="0" anchor="ctr"/>
+                    <a:lstStyle/>
+                    <a:p>
+                      <a:pPr algn="ctr"/>
+                      <a:endParaRPr lang="fr-FR"/>
+                    </a:p>
+                  </p:txBody>
+                </p:sp>
+                <p:sp>
+                  <p:nvSpPr>
+                    <p:cNvPr id="165" name="Délai  164">
+                      <a:extLst>
+                        <a:ext uri="{FF2B5EF4-FFF2-40B4-BE49-F238E27FC236}">
+                          <a16:creationId xmlns:a16="http://schemas.microsoft.com/office/drawing/2014/main" id="{D3A69B17-1772-D833-8E23-D3BC9A1E05A9}"/>
+                        </a:ext>
+                      </a:extLst>
+                    </p:cNvPr>
+                    <p:cNvSpPr/>
+                    <p:nvPr/>
+                  </p:nvSpPr>
+                  <p:spPr>
+                    <a:xfrm rot="5400000">
+                      <a:off x="5966450" y="1712307"/>
+                      <a:ext cx="665704" cy="517793"/>
+                    </a:xfrm>
+                    <a:prstGeom prst="flowChartDelay">
+                      <a:avLst/>
+                    </a:prstGeom>
+                    <a:grpFill/>
+                    <a:ln>
+                      <a:solidFill>
+                        <a:schemeClr val="bg1"/>
+                      </a:solidFill>
+                    </a:ln>
+                  </p:spPr>
+                  <p:style>
+                    <a:lnRef idx="2">
+                      <a:schemeClr val="accent1">
+                        <a:shade val="50000"/>
+                      </a:schemeClr>
+                    </a:lnRef>
+                    <a:fillRef idx="1">
+                      <a:schemeClr val="accent1"/>
+                    </a:fillRef>
+                    <a:effectRef idx="0">
+                      <a:schemeClr val="accent1"/>
+                    </a:effectRef>
+                    <a:fontRef idx="minor">
+                      <a:schemeClr val="lt1"/>
+                    </a:fontRef>
+                  </p:style>
+                  <p:txBody>
+                    <a:bodyPr rtlCol="0" anchor="ctr"/>
+                    <a:lstStyle/>
+                    <a:p>
+                      <a:pPr algn="ctr"/>
+                      <a:endParaRPr lang="fr-FR"/>
+                    </a:p>
+                  </p:txBody>
+                </p:sp>
+              </p:grpSp>
+            </p:grpSp>
+            <p:grpSp>
+              <p:nvGrpSpPr>
+                <p:cNvPr id="107" name="Groupe 106">
+                  <a:extLst>
+                    <a:ext uri="{FF2B5EF4-FFF2-40B4-BE49-F238E27FC236}">
+                      <a16:creationId xmlns:a16="http://schemas.microsoft.com/office/drawing/2014/main" id="{20D33BDB-BCE9-4917-34EB-1E3DE7610922}"/>
+                    </a:ext>
+                  </a:extLst>
+                </p:cNvPr>
+                <p:cNvGrpSpPr/>
+                <p:nvPr/>
+              </p:nvGrpSpPr>
+              <p:grpSpPr>
+                <a:xfrm>
+                  <a:off x="4485192" y="2206422"/>
+                  <a:ext cx="327344" cy="657849"/>
+                  <a:chOff x="6040406" y="972647"/>
+                  <a:chExt cx="327344" cy="657849"/>
+                </a:xfrm>
+              </p:grpSpPr>
+              <p:grpSp>
+                <p:nvGrpSpPr>
+                  <p:cNvPr id="108" name="Groupe 107">
+                    <a:extLst>
+                      <a:ext uri="{FF2B5EF4-FFF2-40B4-BE49-F238E27FC236}">
+                        <a16:creationId xmlns:a16="http://schemas.microsoft.com/office/drawing/2014/main" id="{005AF4D7-0B8E-B171-612F-BDC30F3C8BFB}"/>
+                      </a:ext>
+                    </a:extLst>
+                  </p:cNvPr>
+                  <p:cNvGrpSpPr/>
+                  <p:nvPr/>
+                </p:nvGrpSpPr>
+                <p:grpSpPr>
+                  <a:xfrm>
+                    <a:off x="6040406" y="972647"/>
+                    <a:ext cx="327344" cy="657849"/>
+                    <a:chOff x="6040405" y="972647"/>
+                    <a:chExt cx="517793" cy="1331409"/>
+                  </a:xfrm>
+                </p:grpSpPr>
+                <p:sp>
+                  <p:nvSpPr>
+                    <p:cNvPr id="112" name="Délai  111">
+                      <a:extLst>
+                        <a:ext uri="{FF2B5EF4-FFF2-40B4-BE49-F238E27FC236}">
+                          <a16:creationId xmlns:a16="http://schemas.microsoft.com/office/drawing/2014/main" id="{FB456530-22BA-E149-D57E-7E52D0069CE7}"/>
+                        </a:ext>
+                      </a:extLst>
+                    </p:cNvPr>
+                    <p:cNvSpPr/>
+                    <p:nvPr/>
+                  </p:nvSpPr>
+                  <p:spPr>
+                    <a:xfrm rot="16200000">
+                      <a:off x="5966450" y="1046602"/>
+                      <a:ext cx="665704" cy="517793"/>
+                    </a:xfrm>
+                    <a:prstGeom prst="flowChartDelay">
+                      <a:avLst/>
+                    </a:prstGeom>
+                    <a:solidFill>
+                      <a:schemeClr val="tx1"/>
+                    </a:solidFill>
+                    <a:ln>
+                      <a:solidFill>
+                        <a:schemeClr val="tx1"/>
+                      </a:solidFill>
+                    </a:ln>
+                  </p:spPr>
+                  <p:style>
+                    <a:lnRef idx="2">
+                      <a:schemeClr val="accent1">
+                        <a:shade val="50000"/>
+                      </a:schemeClr>
+                    </a:lnRef>
+                    <a:fillRef idx="1">
+                      <a:schemeClr val="accent1"/>
+                    </a:fillRef>
+                    <a:effectRef idx="0">
+                      <a:schemeClr val="accent1"/>
+                    </a:effectRef>
+                    <a:fontRef idx="minor">
+                      <a:schemeClr val="lt1"/>
+                    </a:fontRef>
+                  </p:style>
+                  <p:txBody>
+                    <a:bodyPr rtlCol="0" anchor="ctr"/>
+                    <a:lstStyle/>
+                    <a:p>
+                      <a:pPr algn="ctr"/>
+                      <a:endParaRPr lang="fr-FR" dirty="0"/>
+                    </a:p>
+                  </p:txBody>
+                </p:sp>
+                <p:sp>
+                  <p:nvSpPr>
+                    <p:cNvPr id="113" name="Délai  112">
+                      <a:extLst>
+                        <a:ext uri="{FF2B5EF4-FFF2-40B4-BE49-F238E27FC236}">
+                          <a16:creationId xmlns:a16="http://schemas.microsoft.com/office/drawing/2014/main" id="{CA09ECF8-1562-728B-2995-D127DD33D4DB}"/>
+                        </a:ext>
+                      </a:extLst>
+                    </p:cNvPr>
+                    <p:cNvSpPr/>
+                    <p:nvPr/>
+                  </p:nvSpPr>
+                  <p:spPr>
+                    <a:xfrm rot="5400000">
+                      <a:off x="5966450" y="1712307"/>
+                      <a:ext cx="665704" cy="517793"/>
+                    </a:xfrm>
+                    <a:prstGeom prst="flowChartDelay">
+                      <a:avLst/>
+                    </a:prstGeom>
+                    <a:solidFill>
+                      <a:schemeClr val="tx1"/>
+                    </a:solidFill>
+                    <a:ln>
+                      <a:solidFill>
+                        <a:schemeClr val="tx1"/>
+                      </a:solidFill>
+                    </a:ln>
+                  </p:spPr>
+                  <p:style>
+                    <a:lnRef idx="2">
+                      <a:schemeClr val="accent1">
+                        <a:shade val="50000"/>
+                      </a:schemeClr>
+                    </a:lnRef>
+                    <a:fillRef idx="1">
+                      <a:schemeClr val="accent1"/>
+                    </a:fillRef>
+                    <a:effectRef idx="0">
+                      <a:schemeClr val="accent1"/>
+                    </a:effectRef>
+                    <a:fontRef idx="minor">
+                      <a:schemeClr val="lt1"/>
+                    </a:fontRef>
+                  </p:style>
+                  <p:txBody>
+                    <a:bodyPr rtlCol="0" anchor="ctr"/>
+                    <a:lstStyle/>
+                    <a:p>
+                      <a:pPr algn="ctr"/>
+                      <a:endParaRPr lang="fr-FR"/>
+                    </a:p>
+                  </p:txBody>
+                </p:sp>
+              </p:grpSp>
+              <p:grpSp>
+                <p:nvGrpSpPr>
+                  <p:cNvPr id="109" name="Groupe 108">
+                    <a:extLst>
+                      <a:ext uri="{FF2B5EF4-FFF2-40B4-BE49-F238E27FC236}">
+                        <a16:creationId xmlns:a16="http://schemas.microsoft.com/office/drawing/2014/main" id="{FE66B860-779F-41A0-5CDA-1C0D8538C05B}"/>
+                      </a:ext>
+                    </a:extLst>
+                  </p:cNvPr>
+                  <p:cNvGrpSpPr/>
+                  <p:nvPr/>
+                </p:nvGrpSpPr>
+                <p:grpSpPr>
+                  <a:xfrm>
+                    <a:off x="6204078" y="1061572"/>
+                    <a:ext cx="55594" cy="328925"/>
+                    <a:chOff x="6040405" y="972647"/>
+                    <a:chExt cx="517793" cy="1331409"/>
+                  </a:xfrm>
+                  <a:solidFill>
+                    <a:schemeClr val="bg1"/>
+                  </a:solidFill>
+                </p:grpSpPr>
+                <p:sp>
+                  <p:nvSpPr>
+                    <p:cNvPr id="110" name="Délai  109">
+                      <a:extLst>
+                        <a:ext uri="{FF2B5EF4-FFF2-40B4-BE49-F238E27FC236}">
+                          <a16:creationId xmlns:a16="http://schemas.microsoft.com/office/drawing/2014/main" id="{9D077592-7E70-BEEB-8F6A-9235D02ADB4B}"/>
+                        </a:ext>
+                      </a:extLst>
+                    </p:cNvPr>
+                    <p:cNvSpPr/>
+                    <p:nvPr/>
+                  </p:nvSpPr>
+                  <p:spPr>
+                    <a:xfrm rot="16200000">
+                      <a:off x="5966450" y="1046602"/>
+                      <a:ext cx="665704" cy="517793"/>
+                    </a:xfrm>
+                    <a:prstGeom prst="flowChartDelay">
+                      <a:avLst/>
+                    </a:prstGeom>
+                    <a:grpFill/>
+                    <a:ln>
+                      <a:solidFill>
+                        <a:schemeClr val="bg1"/>
+                      </a:solidFill>
+                    </a:ln>
+                  </p:spPr>
+                  <p:style>
+                    <a:lnRef idx="2">
+                      <a:schemeClr val="accent1">
+                        <a:shade val="50000"/>
+                      </a:schemeClr>
+                    </a:lnRef>
+                    <a:fillRef idx="1">
+                      <a:schemeClr val="accent1"/>
+                    </a:fillRef>
+                    <a:effectRef idx="0">
+                      <a:schemeClr val="accent1"/>
+                    </a:effectRef>
+                    <a:fontRef idx="minor">
+                      <a:schemeClr val="lt1"/>
+                    </a:fontRef>
+                  </p:style>
+                  <p:txBody>
+                    <a:bodyPr rtlCol="0" anchor="ctr"/>
+                    <a:lstStyle/>
+                    <a:p>
+                      <a:pPr algn="ctr"/>
+                      <a:endParaRPr lang="fr-FR"/>
+                    </a:p>
+                  </p:txBody>
+                </p:sp>
+                <p:sp>
+                  <p:nvSpPr>
+                    <p:cNvPr id="111" name="Délai  110">
+                      <a:extLst>
+                        <a:ext uri="{FF2B5EF4-FFF2-40B4-BE49-F238E27FC236}">
+                          <a16:creationId xmlns:a16="http://schemas.microsoft.com/office/drawing/2014/main" id="{A2CAB173-B54C-0159-A020-B91E1E933F4E}"/>
                         </a:ext>
                       </a:extLst>
                     </p:cNvPr>

</xml_diff>

<commit_message>
Add build instrcutions for macOS
</commit_message>
<xml_diff>
--- a/assets/sprites.pptx
+++ b/assets/sprites.pptx
@@ -7,7 +7,7 @@
   <p:sldIdLst>
     <p:sldId id="256" r:id="rId2"/>
     <p:sldId id="258" r:id="rId3"/>
-    <p:sldId id="257" r:id="rId4"/>
+    <p:sldId id="259" r:id="rId4"/>
   </p:sldIdLst>
   <p:sldSz cx="12192000" cy="6858000"/>
   <p:notesSz cx="6858000" cy="9144000"/>
@@ -10263,10 +10263,10 @@
       </p:grpSpPr>
       <p:grpSp>
         <p:nvGrpSpPr>
-          <p:cNvPr id="4" name="Groupe 3">
+          <p:cNvPr id="16" name="Groupe 15">
             <a:extLst>
               <a:ext uri="{FF2B5EF4-FFF2-40B4-BE49-F238E27FC236}">
-                <a16:creationId xmlns:a16="http://schemas.microsoft.com/office/drawing/2014/main" id="{1F476FB1-3BFB-CBD9-4A93-9B54D5AAF226}"/>
+                <a16:creationId xmlns:a16="http://schemas.microsoft.com/office/drawing/2014/main" id="{8F979CB3-69F6-2AC9-636B-C09375B16D7B}"/>
               </a:ext>
             </a:extLst>
           </p:cNvPr>
@@ -10275,18 +10275,18 @@
         </p:nvGrpSpPr>
         <p:grpSpPr>
           <a:xfrm>
-            <a:off x="642650" y="410378"/>
-            <a:ext cx="10906699" cy="6037244"/>
-            <a:chOff x="642650" y="410378"/>
-            <a:chExt cx="10906699" cy="6037244"/>
+            <a:off x="837282" y="319489"/>
+            <a:ext cx="10928732" cy="6125378"/>
+            <a:chOff x="837282" y="319489"/>
+            <a:chExt cx="10928732" cy="6125378"/>
           </a:xfrm>
         </p:grpSpPr>
         <p:sp>
           <p:nvSpPr>
-            <p:cNvPr id="2" name="Rectangle 1">
+            <p:cNvPr id="4" name="Rectangle 3">
               <a:extLst>
                 <a:ext uri="{FF2B5EF4-FFF2-40B4-BE49-F238E27FC236}">
-                  <a16:creationId xmlns:a16="http://schemas.microsoft.com/office/drawing/2014/main" id="{A5B5F5AC-BD6C-A08C-D40A-8E31E6728E73}"/>
+                  <a16:creationId xmlns:a16="http://schemas.microsoft.com/office/drawing/2014/main" id="{32C41B8F-A80E-AA9D-31A5-E9719D54BBBE}"/>
                 </a:ext>
               </a:extLst>
             </p:cNvPr>
@@ -10295,18 +10295,18 @@
           </p:nvSpPr>
           <p:spPr>
             <a:xfrm>
-              <a:off x="642650" y="410378"/>
-              <a:ext cx="10906699" cy="6037244"/>
+              <a:off x="837282" y="319489"/>
+              <a:ext cx="10928732" cy="6125378"/>
             </a:xfrm>
             <a:prstGeom prst="rect">
               <a:avLst/>
             </a:prstGeom>
             <a:solidFill>
-              <a:schemeClr val="tx1"/>
+              <a:srgbClr val="00B0F0"/>
             </a:solidFill>
             <a:ln>
               <a:solidFill>
-                <a:schemeClr val="tx1"/>
+                <a:srgbClr val="00B0F0"/>
               </a:solidFill>
             </a:ln>
           </p:spPr>
@@ -10331,16 +10331,16 @@
             <a:lstStyle/>
             <a:p>
               <a:pPr algn="ctr"/>
-              <a:endParaRPr lang="fr-FR" dirty="0"/>
+              <a:endParaRPr lang="fr-FR"/>
             </a:p>
           </p:txBody>
         </p:sp>
         <p:sp>
           <p:nvSpPr>
-            <p:cNvPr id="3" name="Ellipse 2">
+            <p:cNvPr id="5" name="Nuage 4">
               <a:extLst>
                 <a:ext uri="{FF2B5EF4-FFF2-40B4-BE49-F238E27FC236}">
-                  <a16:creationId xmlns:a16="http://schemas.microsoft.com/office/drawing/2014/main" id="{DB632C79-648E-2860-4C00-EFA11783014C}"/>
+                  <a16:creationId xmlns:a16="http://schemas.microsoft.com/office/drawing/2014/main" id="{D9A3DF6C-FB79-7258-01D5-4886E0A95DAD}"/>
                 </a:ext>
               </a:extLst>
             </p:cNvPr>
@@ -10349,10 +10349,10 @@
           </p:nvSpPr>
           <p:spPr>
             <a:xfrm>
-              <a:off x="2985571" y="1134738"/>
-              <a:ext cx="154236" cy="154235"/>
+              <a:off x="1773715" y="605927"/>
+              <a:ext cx="3084723" cy="1046603"/>
             </a:xfrm>
-            <a:prstGeom prst="ellipse">
+            <a:prstGeom prst="cloud">
               <a:avLst/>
             </a:prstGeom>
             <a:solidFill>
@@ -10391,10 +10391,10 @@
         </p:sp>
         <p:sp>
           <p:nvSpPr>
-            <p:cNvPr id="8" name="Ellipse 7">
+            <p:cNvPr id="7" name="Nuage 6">
               <a:extLst>
                 <a:ext uri="{FF2B5EF4-FFF2-40B4-BE49-F238E27FC236}">
-                  <a16:creationId xmlns:a16="http://schemas.microsoft.com/office/drawing/2014/main" id="{0C76B29C-9440-C9B2-3680-73ED2B7E4593}"/>
+                  <a16:creationId xmlns:a16="http://schemas.microsoft.com/office/drawing/2014/main" id="{5EC0D484-4549-199A-7792-525C6C4CCE89}"/>
                 </a:ext>
               </a:extLst>
             </p:cNvPr>
@@ -10403,10 +10403,10 @@
           </p:nvSpPr>
           <p:spPr>
             <a:xfrm>
-              <a:off x="2245605" y="2091370"/>
-              <a:ext cx="154236" cy="154235"/>
+              <a:off x="8593157" y="703243"/>
+              <a:ext cx="2091368" cy="596747"/>
             </a:xfrm>
-            <a:prstGeom prst="ellipse">
+            <a:prstGeom prst="cloud">
               <a:avLst/>
             </a:prstGeom>
             <a:solidFill>
@@ -10445,10 +10445,10 @@
         </p:sp>
         <p:sp>
           <p:nvSpPr>
-            <p:cNvPr id="9" name="Ellipse 8">
+            <p:cNvPr id="8" name="Nuage 7">
               <a:extLst>
                 <a:ext uri="{FF2B5EF4-FFF2-40B4-BE49-F238E27FC236}">
-                  <a16:creationId xmlns:a16="http://schemas.microsoft.com/office/drawing/2014/main" id="{FFFF73AF-7618-2AC5-D716-06B7048C07A5}"/>
+                  <a16:creationId xmlns:a16="http://schemas.microsoft.com/office/drawing/2014/main" id="{AA85AABB-8CBC-EFBA-B5DE-47489DA8EBB3}"/>
                 </a:ext>
               </a:extLst>
             </p:cNvPr>
@@ -10457,10 +10457,10 @@
           </p:nvSpPr>
           <p:spPr>
             <a:xfrm>
-              <a:off x="4944737" y="1804931"/>
-              <a:ext cx="154236" cy="154235"/>
+              <a:off x="4858438" y="1652530"/>
+              <a:ext cx="3084723" cy="596748"/>
             </a:xfrm>
-            <a:prstGeom prst="ellipse">
+            <a:prstGeom prst="cloud">
               <a:avLst/>
             </a:prstGeom>
             <a:solidFill>
@@ -10499,10 +10499,10 @@
         </p:sp>
         <p:sp>
           <p:nvSpPr>
-            <p:cNvPr id="14" name="Ellipse 13">
+            <p:cNvPr id="9" name="Nuage 8">
               <a:extLst>
                 <a:ext uri="{FF2B5EF4-FFF2-40B4-BE49-F238E27FC236}">
-                  <a16:creationId xmlns:a16="http://schemas.microsoft.com/office/drawing/2014/main" id="{0C4F9742-701A-443A-80DD-EAF5760BD1F8}"/>
+                  <a16:creationId xmlns:a16="http://schemas.microsoft.com/office/drawing/2014/main" id="{C6D5A25F-67DB-36DF-29D9-81334FF5FF95}"/>
                 </a:ext>
               </a:extLst>
             </p:cNvPr>
@@ -10511,10 +10511,10 @@
           </p:nvSpPr>
           <p:spPr>
             <a:xfrm>
-              <a:off x="3413393" y="2653229"/>
-              <a:ext cx="154236" cy="154235"/>
+              <a:off x="2115239" y="3194892"/>
+              <a:ext cx="1597445" cy="705079"/>
             </a:xfrm>
-            <a:prstGeom prst="ellipse">
+            <a:prstGeom prst="cloud">
               <a:avLst/>
             </a:prstGeom>
             <a:solidFill>
@@ -10551,983 +10551,277 @@
             </a:p>
           </p:txBody>
         </p:sp>
-        <p:sp>
-          <p:nvSpPr>
-            <p:cNvPr id="15" name="Ellipse 14">
+        <p:grpSp>
+          <p:nvGrpSpPr>
+            <p:cNvPr id="12" name="Groupe 11">
               <a:extLst>
                 <a:ext uri="{FF2B5EF4-FFF2-40B4-BE49-F238E27FC236}">
-                  <a16:creationId xmlns:a16="http://schemas.microsoft.com/office/drawing/2014/main" id="{8E56884E-17C6-DBA1-39B3-CEE9B247F9A2}"/>
+                  <a16:creationId xmlns:a16="http://schemas.microsoft.com/office/drawing/2014/main" id="{7CED2E08-D159-C593-3427-E5C6CE762465}"/>
                 </a:ext>
               </a:extLst>
             </p:cNvPr>
-            <p:cNvSpPr/>
+            <p:cNvGrpSpPr/>
             <p:nvPr/>
-          </p:nvSpPr>
-          <p:spPr>
+          </p:nvGrpSpPr>
+          <p:grpSpPr>
             <a:xfrm>
-              <a:off x="5561682" y="3351882"/>
-              <a:ext cx="154236" cy="154235"/>
+              <a:off x="8257142" y="2249278"/>
+              <a:ext cx="1597445" cy="3095479"/>
+              <a:chOff x="8273208" y="1839816"/>
+              <a:chExt cx="1597445" cy="3095479"/>
             </a:xfrm>
-            <a:prstGeom prst="ellipse">
-              <a:avLst/>
-            </a:prstGeom>
-            <a:solidFill>
-              <a:schemeClr val="bg1"/>
-            </a:solidFill>
-            <a:ln>
+          </p:grpSpPr>
+          <p:sp>
+            <p:nvSpPr>
+              <p:cNvPr id="10" name="Rectangle 9">
+                <a:extLst>
+                  <a:ext uri="{FF2B5EF4-FFF2-40B4-BE49-F238E27FC236}">
+                    <a16:creationId xmlns:a16="http://schemas.microsoft.com/office/drawing/2014/main" id="{2EA0E601-FE6F-12DC-2BC5-EC60063FC2B1}"/>
+                  </a:ext>
+                </a:extLst>
+              </p:cNvPr>
+              <p:cNvSpPr/>
+              <p:nvPr/>
+            </p:nvSpPr>
+            <p:spPr>
+              <a:xfrm>
+                <a:off x="8857561" y="2544895"/>
+                <a:ext cx="390639" cy="2390400"/>
+              </a:xfrm>
+              <a:prstGeom prst="rect">
+                <a:avLst/>
+              </a:prstGeom>
               <a:solidFill>
-                <a:schemeClr val="bg1"/>
+                <a:schemeClr val="accent2">
+                  <a:lumMod val="50000"/>
+                </a:schemeClr>
               </a:solidFill>
-            </a:ln>
-          </p:spPr>
-          <p:style>
-            <a:lnRef idx="2">
-              <a:schemeClr val="accent1">
-                <a:shade val="50000"/>
-              </a:schemeClr>
-            </a:lnRef>
-            <a:fillRef idx="1">
-              <a:schemeClr val="accent1"/>
-            </a:fillRef>
-            <a:effectRef idx="0">
-              <a:schemeClr val="accent1"/>
-            </a:effectRef>
-            <a:fontRef idx="minor">
-              <a:schemeClr val="lt1"/>
-            </a:fontRef>
-          </p:style>
-          <p:txBody>
-            <a:bodyPr rtlCol="0" anchor="ctr"/>
-            <a:lstStyle/>
-            <a:p>
-              <a:pPr algn="ctr"/>
-              <a:endParaRPr lang="fr-FR"/>
-            </a:p>
-          </p:txBody>
-        </p:sp>
-        <p:sp>
-          <p:nvSpPr>
-            <p:cNvPr id="16" name="Ellipse 15">
+              <a:ln>
+                <a:solidFill>
+                  <a:schemeClr val="accent2">
+                    <a:lumMod val="50000"/>
+                  </a:schemeClr>
+                </a:solidFill>
+              </a:ln>
+            </p:spPr>
+            <p:style>
+              <a:lnRef idx="2">
+                <a:schemeClr val="accent1">
+                  <a:shade val="50000"/>
+                </a:schemeClr>
+              </a:lnRef>
+              <a:fillRef idx="1">
+                <a:schemeClr val="accent1"/>
+              </a:fillRef>
+              <a:effectRef idx="0">
+                <a:schemeClr val="accent1"/>
+              </a:effectRef>
+              <a:fontRef idx="minor">
+                <a:schemeClr val="lt1"/>
+              </a:fontRef>
+            </p:style>
+            <p:txBody>
+              <a:bodyPr rtlCol="0" anchor="ctr"/>
+              <a:lstStyle/>
+              <a:p>
+                <a:pPr algn="ctr"/>
+                <a:endParaRPr lang="fr-FR"/>
+              </a:p>
+            </p:txBody>
+          </p:sp>
+          <p:sp>
+            <p:nvSpPr>
+              <p:cNvPr id="11" name="Nuage 10">
+                <a:extLst>
+                  <a:ext uri="{FF2B5EF4-FFF2-40B4-BE49-F238E27FC236}">
+                    <a16:creationId xmlns:a16="http://schemas.microsoft.com/office/drawing/2014/main" id="{3D8F23FF-DA21-DCE7-3005-0DC40B368D87}"/>
+                  </a:ext>
+                </a:extLst>
+              </p:cNvPr>
+              <p:cNvSpPr/>
+              <p:nvPr/>
+            </p:nvSpPr>
+            <p:spPr>
+              <a:xfrm>
+                <a:off x="8273208" y="1839816"/>
+                <a:ext cx="1597445" cy="1355076"/>
+              </a:xfrm>
+              <a:prstGeom prst="cloud">
+                <a:avLst/>
+              </a:prstGeom>
+              <a:solidFill>
+                <a:srgbClr val="00B050"/>
+              </a:solidFill>
+              <a:ln>
+                <a:solidFill>
+                  <a:srgbClr val="00B050"/>
+                </a:solidFill>
+              </a:ln>
+            </p:spPr>
+            <p:style>
+              <a:lnRef idx="2">
+                <a:schemeClr val="accent1">
+                  <a:shade val="50000"/>
+                </a:schemeClr>
+              </a:lnRef>
+              <a:fillRef idx="1">
+                <a:schemeClr val="accent1"/>
+              </a:fillRef>
+              <a:effectRef idx="0">
+                <a:schemeClr val="accent1"/>
+              </a:effectRef>
+              <a:fontRef idx="minor">
+                <a:schemeClr val="lt1"/>
+              </a:fontRef>
+            </p:style>
+            <p:txBody>
+              <a:bodyPr rtlCol="0" anchor="ctr"/>
+              <a:lstStyle/>
+              <a:p>
+                <a:pPr algn="ctr"/>
+                <a:endParaRPr lang="fr-FR"/>
+              </a:p>
+            </p:txBody>
+          </p:sp>
+        </p:grpSp>
+        <p:grpSp>
+          <p:nvGrpSpPr>
+            <p:cNvPr id="13" name="Groupe 12">
               <a:extLst>
                 <a:ext uri="{FF2B5EF4-FFF2-40B4-BE49-F238E27FC236}">
-                  <a16:creationId xmlns:a16="http://schemas.microsoft.com/office/drawing/2014/main" id="{C89D9717-6B58-31B9-724C-1FE3DF7419AD}"/>
+                  <a16:creationId xmlns:a16="http://schemas.microsoft.com/office/drawing/2014/main" id="{B6963B59-4192-680D-55B1-AC38EA8F253D}"/>
                 </a:ext>
               </a:extLst>
             </p:cNvPr>
-            <p:cNvSpPr/>
+            <p:cNvGrpSpPr/>
             <p:nvPr/>
-          </p:nvSpPr>
-          <p:spPr>
+          </p:nvGrpSpPr>
+          <p:grpSpPr>
             <a:xfrm>
-              <a:off x="1804930" y="4151523"/>
-              <a:ext cx="154236" cy="154235"/>
+              <a:off x="4332613" y="2021487"/>
+              <a:ext cx="1969035" cy="3463041"/>
+              <a:chOff x="8290445" y="2110720"/>
+              <a:chExt cx="1597445" cy="2824575"/>
             </a:xfrm>
-            <a:prstGeom prst="ellipse">
-              <a:avLst/>
-            </a:prstGeom>
-            <a:solidFill>
-              <a:schemeClr val="bg1"/>
-            </a:solidFill>
-            <a:ln>
+          </p:grpSpPr>
+          <p:sp>
+            <p:nvSpPr>
+              <p:cNvPr id="14" name="Rectangle 13">
+                <a:extLst>
+                  <a:ext uri="{FF2B5EF4-FFF2-40B4-BE49-F238E27FC236}">
+                    <a16:creationId xmlns:a16="http://schemas.microsoft.com/office/drawing/2014/main" id="{BEF6F21A-8CFA-2427-C47A-DA7D088D2DA1}"/>
+                  </a:ext>
+                </a:extLst>
+              </p:cNvPr>
+              <p:cNvSpPr/>
+              <p:nvPr/>
+            </p:nvSpPr>
+            <p:spPr>
+              <a:xfrm>
+                <a:off x="8857561" y="2544895"/>
+                <a:ext cx="390639" cy="2390400"/>
+              </a:xfrm>
+              <a:prstGeom prst="rect">
+                <a:avLst/>
+              </a:prstGeom>
               <a:solidFill>
-                <a:schemeClr val="bg1"/>
+                <a:schemeClr val="accent2">
+                  <a:lumMod val="50000"/>
+                </a:schemeClr>
               </a:solidFill>
-            </a:ln>
-          </p:spPr>
-          <p:style>
-            <a:lnRef idx="2">
-              <a:schemeClr val="accent1">
-                <a:shade val="50000"/>
-              </a:schemeClr>
-            </a:lnRef>
-            <a:fillRef idx="1">
-              <a:schemeClr val="accent1"/>
-            </a:fillRef>
-            <a:effectRef idx="0">
-              <a:schemeClr val="accent1"/>
-            </a:effectRef>
-            <a:fontRef idx="minor">
-              <a:schemeClr val="lt1"/>
-            </a:fontRef>
-          </p:style>
-          <p:txBody>
-            <a:bodyPr rtlCol="0" anchor="ctr"/>
-            <a:lstStyle/>
-            <a:p>
-              <a:pPr algn="ctr"/>
-              <a:endParaRPr lang="fr-FR"/>
-            </a:p>
-          </p:txBody>
-        </p:sp>
-        <p:sp>
-          <p:nvSpPr>
-            <p:cNvPr id="17" name="Ellipse 16">
-              <a:extLst>
-                <a:ext uri="{FF2B5EF4-FFF2-40B4-BE49-F238E27FC236}">
-                  <a16:creationId xmlns:a16="http://schemas.microsoft.com/office/drawing/2014/main" id="{8C22146C-6EEE-67BC-F8B4-85EC1F59F30C}"/>
-                </a:ext>
-              </a:extLst>
-            </p:cNvPr>
-            <p:cNvSpPr/>
-            <p:nvPr/>
-          </p:nvSpPr>
-          <p:spPr>
-            <a:xfrm>
-              <a:off x="1419340" y="3197647"/>
-              <a:ext cx="154236" cy="154235"/>
-            </a:xfrm>
-            <a:prstGeom prst="ellipse">
-              <a:avLst/>
-            </a:prstGeom>
-            <a:solidFill>
-              <a:schemeClr val="bg1"/>
-            </a:solidFill>
-            <a:ln>
+              <a:ln>
+                <a:solidFill>
+                  <a:schemeClr val="accent2">
+                    <a:lumMod val="50000"/>
+                  </a:schemeClr>
+                </a:solidFill>
+              </a:ln>
+            </p:spPr>
+            <p:style>
+              <a:lnRef idx="2">
+                <a:schemeClr val="accent1">
+                  <a:shade val="50000"/>
+                </a:schemeClr>
+              </a:lnRef>
+              <a:fillRef idx="1">
+                <a:schemeClr val="accent1"/>
+              </a:fillRef>
+              <a:effectRef idx="0">
+                <a:schemeClr val="accent1"/>
+              </a:effectRef>
+              <a:fontRef idx="minor">
+                <a:schemeClr val="lt1"/>
+              </a:fontRef>
+            </p:style>
+            <p:txBody>
+              <a:bodyPr rtlCol="0" anchor="ctr"/>
+              <a:lstStyle/>
+              <a:p>
+                <a:pPr algn="ctr"/>
+                <a:endParaRPr lang="fr-FR"/>
+              </a:p>
+            </p:txBody>
+          </p:sp>
+          <p:sp>
+            <p:nvSpPr>
+              <p:cNvPr id="15" name="Nuage 14">
+                <a:extLst>
+                  <a:ext uri="{FF2B5EF4-FFF2-40B4-BE49-F238E27FC236}">
+                    <a16:creationId xmlns:a16="http://schemas.microsoft.com/office/drawing/2014/main" id="{15CA5849-5F6D-8BE8-17F2-7A94639551C3}"/>
+                  </a:ext>
+                </a:extLst>
+              </p:cNvPr>
+              <p:cNvSpPr/>
+              <p:nvPr/>
+            </p:nvSpPr>
+            <p:spPr>
+              <a:xfrm>
+                <a:off x="8290445" y="2110720"/>
+                <a:ext cx="1597445" cy="868349"/>
+              </a:xfrm>
+              <a:prstGeom prst="cloud">
+                <a:avLst/>
+              </a:prstGeom>
               <a:solidFill>
-                <a:schemeClr val="bg1"/>
+                <a:srgbClr val="00B050"/>
               </a:solidFill>
-            </a:ln>
-          </p:spPr>
-          <p:style>
-            <a:lnRef idx="2">
-              <a:schemeClr val="accent1">
-                <a:shade val="50000"/>
-              </a:schemeClr>
-            </a:lnRef>
-            <a:fillRef idx="1">
-              <a:schemeClr val="accent1"/>
-            </a:fillRef>
-            <a:effectRef idx="0">
-              <a:schemeClr val="accent1"/>
-            </a:effectRef>
-            <a:fontRef idx="minor">
-              <a:schemeClr val="lt1"/>
-            </a:fontRef>
-          </p:style>
-          <p:txBody>
-            <a:bodyPr rtlCol="0" anchor="ctr"/>
-            <a:lstStyle/>
-            <a:p>
-              <a:pPr algn="ctr"/>
-              <a:endParaRPr lang="fr-FR"/>
-            </a:p>
-          </p:txBody>
-        </p:sp>
-        <p:sp>
-          <p:nvSpPr>
-            <p:cNvPr id="18" name="Ellipse 17">
-              <a:extLst>
-                <a:ext uri="{FF2B5EF4-FFF2-40B4-BE49-F238E27FC236}">
-                  <a16:creationId xmlns:a16="http://schemas.microsoft.com/office/drawing/2014/main" id="{8DA89945-DA52-EBDF-EB12-BB927DADE3B1}"/>
-                </a:ext>
-              </a:extLst>
-            </p:cNvPr>
-            <p:cNvSpPr/>
-            <p:nvPr/>
-          </p:nvSpPr>
-          <p:spPr>
-            <a:xfrm>
-              <a:off x="7522684" y="1068636"/>
-              <a:ext cx="154236" cy="154235"/>
-            </a:xfrm>
-            <a:prstGeom prst="ellipse">
-              <a:avLst/>
-            </a:prstGeom>
-            <a:solidFill>
-              <a:schemeClr val="bg1"/>
-            </a:solidFill>
-            <a:ln>
-              <a:solidFill>
-                <a:schemeClr val="bg1"/>
-              </a:solidFill>
-            </a:ln>
-          </p:spPr>
-          <p:style>
-            <a:lnRef idx="2">
-              <a:schemeClr val="accent1">
-                <a:shade val="50000"/>
-              </a:schemeClr>
-            </a:lnRef>
-            <a:fillRef idx="1">
-              <a:schemeClr val="accent1"/>
-            </a:fillRef>
-            <a:effectRef idx="0">
-              <a:schemeClr val="accent1"/>
-            </a:effectRef>
-            <a:fontRef idx="minor">
-              <a:schemeClr val="lt1"/>
-            </a:fontRef>
-          </p:style>
-          <p:txBody>
-            <a:bodyPr rtlCol="0" anchor="ctr"/>
-            <a:lstStyle/>
-            <a:p>
-              <a:pPr algn="ctr"/>
-              <a:endParaRPr lang="fr-FR"/>
-            </a:p>
-          </p:txBody>
-        </p:sp>
-        <p:sp>
-          <p:nvSpPr>
-            <p:cNvPr id="19" name="Ellipse 18">
-              <a:extLst>
-                <a:ext uri="{FF2B5EF4-FFF2-40B4-BE49-F238E27FC236}">
-                  <a16:creationId xmlns:a16="http://schemas.microsoft.com/office/drawing/2014/main" id="{FE111824-B137-2B25-067B-E40C52099D95}"/>
-                </a:ext>
-              </a:extLst>
-            </p:cNvPr>
-            <p:cNvSpPr/>
-            <p:nvPr/>
-          </p:nvSpPr>
-          <p:spPr>
-            <a:xfrm>
-              <a:off x="3062689" y="4999822"/>
-              <a:ext cx="154236" cy="154235"/>
-            </a:xfrm>
-            <a:prstGeom prst="ellipse">
-              <a:avLst/>
-            </a:prstGeom>
-            <a:solidFill>
-              <a:schemeClr val="bg1"/>
-            </a:solidFill>
-            <a:ln>
-              <a:solidFill>
-                <a:schemeClr val="bg1"/>
-              </a:solidFill>
-            </a:ln>
-          </p:spPr>
-          <p:style>
-            <a:lnRef idx="2">
-              <a:schemeClr val="accent1">
-                <a:shade val="50000"/>
-              </a:schemeClr>
-            </a:lnRef>
-            <a:fillRef idx="1">
-              <a:schemeClr val="accent1"/>
-            </a:fillRef>
-            <a:effectRef idx="0">
-              <a:schemeClr val="accent1"/>
-            </a:effectRef>
-            <a:fontRef idx="minor">
-              <a:schemeClr val="lt1"/>
-            </a:fontRef>
-          </p:style>
-          <p:txBody>
-            <a:bodyPr rtlCol="0" anchor="ctr"/>
-            <a:lstStyle/>
-            <a:p>
-              <a:pPr algn="ctr"/>
-              <a:endParaRPr lang="fr-FR"/>
-            </a:p>
-          </p:txBody>
-        </p:sp>
-        <p:sp>
-          <p:nvSpPr>
-            <p:cNvPr id="20" name="Ellipse 19">
-              <a:extLst>
-                <a:ext uri="{FF2B5EF4-FFF2-40B4-BE49-F238E27FC236}">
-                  <a16:creationId xmlns:a16="http://schemas.microsoft.com/office/drawing/2014/main" id="{B78AA188-C09A-4053-2DB8-402A4FF7E6A1}"/>
-                </a:ext>
-              </a:extLst>
-            </p:cNvPr>
-            <p:cNvSpPr/>
-            <p:nvPr/>
-          </p:nvSpPr>
-          <p:spPr>
-            <a:xfrm>
-              <a:off x="4250675" y="4151522"/>
-              <a:ext cx="154236" cy="154235"/>
-            </a:xfrm>
-            <a:prstGeom prst="ellipse">
-              <a:avLst/>
-            </a:prstGeom>
-            <a:solidFill>
-              <a:schemeClr val="bg1"/>
-            </a:solidFill>
-            <a:ln>
-              <a:solidFill>
-                <a:schemeClr val="bg1"/>
-              </a:solidFill>
-            </a:ln>
-          </p:spPr>
-          <p:style>
-            <a:lnRef idx="2">
-              <a:schemeClr val="accent1">
-                <a:shade val="50000"/>
-              </a:schemeClr>
-            </a:lnRef>
-            <a:fillRef idx="1">
-              <a:schemeClr val="accent1"/>
-            </a:fillRef>
-            <a:effectRef idx="0">
-              <a:schemeClr val="accent1"/>
-            </a:effectRef>
-            <a:fontRef idx="minor">
-              <a:schemeClr val="lt1"/>
-            </a:fontRef>
-          </p:style>
-          <p:txBody>
-            <a:bodyPr rtlCol="0" anchor="ctr"/>
-            <a:lstStyle/>
-            <a:p>
-              <a:pPr algn="ctr"/>
-              <a:endParaRPr lang="fr-FR"/>
-            </a:p>
-          </p:txBody>
-        </p:sp>
-        <p:sp>
-          <p:nvSpPr>
-            <p:cNvPr id="21" name="Ellipse 20">
-              <a:extLst>
-                <a:ext uri="{FF2B5EF4-FFF2-40B4-BE49-F238E27FC236}">
-                  <a16:creationId xmlns:a16="http://schemas.microsoft.com/office/drawing/2014/main" id="{37AFA0A1-BE10-9A2F-7310-0281580C6899}"/>
-                </a:ext>
-              </a:extLst>
-            </p:cNvPr>
-            <p:cNvSpPr/>
-            <p:nvPr/>
-          </p:nvSpPr>
-          <p:spPr>
-            <a:xfrm>
-              <a:off x="7676920" y="2443909"/>
-              <a:ext cx="154236" cy="154235"/>
-            </a:xfrm>
-            <a:prstGeom prst="ellipse">
-              <a:avLst/>
-            </a:prstGeom>
-            <a:solidFill>
-              <a:schemeClr val="bg1"/>
-            </a:solidFill>
-            <a:ln>
-              <a:solidFill>
-                <a:schemeClr val="bg1"/>
-              </a:solidFill>
-            </a:ln>
-          </p:spPr>
-          <p:style>
-            <a:lnRef idx="2">
-              <a:schemeClr val="accent1">
-                <a:shade val="50000"/>
-              </a:schemeClr>
-            </a:lnRef>
-            <a:fillRef idx="1">
-              <a:schemeClr val="accent1"/>
-            </a:fillRef>
-            <a:effectRef idx="0">
-              <a:schemeClr val="accent1"/>
-            </a:effectRef>
-            <a:fontRef idx="minor">
-              <a:schemeClr val="lt1"/>
-            </a:fontRef>
-          </p:style>
-          <p:txBody>
-            <a:bodyPr rtlCol="0" anchor="ctr"/>
-            <a:lstStyle/>
-            <a:p>
-              <a:pPr algn="ctr"/>
-              <a:endParaRPr lang="fr-FR"/>
-            </a:p>
-          </p:txBody>
-        </p:sp>
-        <p:sp>
-          <p:nvSpPr>
-            <p:cNvPr id="22" name="Ellipse 21">
-              <a:extLst>
-                <a:ext uri="{FF2B5EF4-FFF2-40B4-BE49-F238E27FC236}">
-                  <a16:creationId xmlns:a16="http://schemas.microsoft.com/office/drawing/2014/main" id="{620FB4B3-41A1-DEF7-3EC7-883169BB96B4}"/>
-                </a:ext>
-              </a:extLst>
-            </p:cNvPr>
-            <p:cNvSpPr/>
-            <p:nvPr/>
-          </p:nvSpPr>
-          <p:spPr>
-            <a:xfrm>
-              <a:off x="6178627" y="1134737"/>
-              <a:ext cx="154236" cy="154235"/>
-            </a:xfrm>
-            <a:prstGeom prst="ellipse">
-              <a:avLst/>
-            </a:prstGeom>
-            <a:solidFill>
-              <a:schemeClr val="bg1"/>
-            </a:solidFill>
-            <a:ln>
-              <a:solidFill>
-                <a:schemeClr val="bg1"/>
-              </a:solidFill>
-            </a:ln>
-          </p:spPr>
-          <p:style>
-            <a:lnRef idx="2">
-              <a:schemeClr val="accent1">
-                <a:shade val="50000"/>
-              </a:schemeClr>
-            </a:lnRef>
-            <a:fillRef idx="1">
-              <a:schemeClr val="accent1"/>
-            </a:fillRef>
-            <a:effectRef idx="0">
-              <a:schemeClr val="accent1"/>
-            </a:effectRef>
-            <a:fontRef idx="minor">
-              <a:schemeClr val="lt1"/>
-            </a:fontRef>
-          </p:style>
-          <p:txBody>
-            <a:bodyPr rtlCol="0" anchor="ctr"/>
-            <a:lstStyle/>
-            <a:p>
-              <a:pPr algn="ctr"/>
-              <a:endParaRPr lang="fr-FR"/>
-            </a:p>
-          </p:txBody>
-        </p:sp>
-        <p:sp>
-          <p:nvSpPr>
-            <p:cNvPr id="23" name="Ellipse 22">
-              <a:extLst>
-                <a:ext uri="{FF2B5EF4-FFF2-40B4-BE49-F238E27FC236}">
-                  <a16:creationId xmlns:a16="http://schemas.microsoft.com/office/drawing/2014/main" id="{A7D28FB9-9892-EE47-1EDA-19F4E0CE31E2}"/>
-                </a:ext>
-              </a:extLst>
-            </p:cNvPr>
-            <p:cNvSpPr/>
-            <p:nvPr/>
-          </p:nvSpPr>
-          <p:spPr>
-            <a:xfrm>
-              <a:off x="6332863" y="5076939"/>
-              <a:ext cx="154236" cy="154235"/>
-            </a:xfrm>
-            <a:prstGeom prst="ellipse">
-              <a:avLst/>
-            </a:prstGeom>
-            <a:solidFill>
-              <a:schemeClr val="bg1"/>
-            </a:solidFill>
-            <a:ln>
-              <a:solidFill>
-                <a:schemeClr val="bg1"/>
-              </a:solidFill>
-            </a:ln>
-          </p:spPr>
-          <p:style>
-            <a:lnRef idx="2">
-              <a:schemeClr val="accent1">
-                <a:shade val="50000"/>
-              </a:schemeClr>
-            </a:lnRef>
-            <a:fillRef idx="1">
-              <a:schemeClr val="accent1"/>
-            </a:fillRef>
-            <a:effectRef idx="0">
-              <a:schemeClr val="accent1"/>
-            </a:effectRef>
-            <a:fontRef idx="minor">
-              <a:schemeClr val="lt1"/>
-            </a:fontRef>
-          </p:style>
-          <p:txBody>
-            <a:bodyPr rtlCol="0" anchor="ctr"/>
-            <a:lstStyle/>
-            <a:p>
-              <a:pPr algn="ctr"/>
-              <a:endParaRPr lang="fr-FR"/>
-            </a:p>
-          </p:txBody>
-        </p:sp>
-        <p:sp>
-          <p:nvSpPr>
-            <p:cNvPr id="24" name="Ellipse 23">
-              <a:extLst>
-                <a:ext uri="{FF2B5EF4-FFF2-40B4-BE49-F238E27FC236}">
-                  <a16:creationId xmlns:a16="http://schemas.microsoft.com/office/drawing/2014/main" id="{9F9C344A-3478-EF63-3142-4CC5C0A1B7B5}"/>
-                </a:ext>
-              </a:extLst>
-            </p:cNvPr>
-            <p:cNvSpPr/>
-            <p:nvPr/>
-          </p:nvSpPr>
-          <p:spPr>
-            <a:xfrm>
-              <a:off x="7522684" y="3997287"/>
-              <a:ext cx="154236" cy="154235"/>
-            </a:xfrm>
-            <a:prstGeom prst="ellipse">
-              <a:avLst/>
-            </a:prstGeom>
-            <a:solidFill>
-              <a:schemeClr val="bg1"/>
-            </a:solidFill>
-            <a:ln>
-              <a:solidFill>
-                <a:schemeClr val="bg1"/>
-              </a:solidFill>
-            </a:ln>
-          </p:spPr>
-          <p:style>
-            <a:lnRef idx="2">
-              <a:schemeClr val="accent1">
-                <a:shade val="50000"/>
-              </a:schemeClr>
-            </a:lnRef>
-            <a:fillRef idx="1">
-              <a:schemeClr val="accent1"/>
-            </a:fillRef>
-            <a:effectRef idx="0">
-              <a:schemeClr val="accent1"/>
-            </a:effectRef>
-            <a:fontRef idx="minor">
-              <a:schemeClr val="lt1"/>
-            </a:fontRef>
-          </p:style>
-          <p:txBody>
-            <a:bodyPr rtlCol="0" anchor="ctr"/>
-            <a:lstStyle/>
-            <a:p>
-              <a:pPr algn="ctr"/>
-              <a:endParaRPr lang="fr-FR"/>
-            </a:p>
-          </p:txBody>
-        </p:sp>
-        <p:sp>
-          <p:nvSpPr>
-            <p:cNvPr id="25" name="Ellipse 24">
-              <a:extLst>
-                <a:ext uri="{FF2B5EF4-FFF2-40B4-BE49-F238E27FC236}">
-                  <a16:creationId xmlns:a16="http://schemas.microsoft.com/office/drawing/2014/main" id="{16F828E3-1CDF-4C7E-9528-913BC46984D0}"/>
-                </a:ext>
-              </a:extLst>
-            </p:cNvPr>
-            <p:cNvSpPr/>
-            <p:nvPr/>
-          </p:nvSpPr>
-          <p:spPr>
-            <a:xfrm>
-              <a:off x="9296400" y="3765933"/>
-              <a:ext cx="154236" cy="154235"/>
-            </a:xfrm>
-            <a:prstGeom prst="ellipse">
-              <a:avLst/>
-            </a:prstGeom>
-            <a:solidFill>
-              <a:schemeClr val="bg1"/>
-            </a:solidFill>
-            <a:ln>
-              <a:solidFill>
-                <a:schemeClr val="bg1"/>
-              </a:solidFill>
-            </a:ln>
-          </p:spPr>
-          <p:style>
-            <a:lnRef idx="2">
-              <a:schemeClr val="accent1">
-                <a:shade val="50000"/>
-              </a:schemeClr>
-            </a:lnRef>
-            <a:fillRef idx="1">
-              <a:schemeClr val="accent1"/>
-            </a:fillRef>
-            <a:effectRef idx="0">
-              <a:schemeClr val="accent1"/>
-            </a:effectRef>
-            <a:fontRef idx="minor">
-              <a:schemeClr val="lt1"/>
-            </a:fontRef>
-          </p:style>
-          <p:txBody>
-            <a:bodyPr rtlCol="0" anchor="ctr"/>
-            <a:lstStyle/>
-            <a:p>
-              <a:pPr algn="ctr"/>
-              <a:endParaRPr lang="fr-FR"/>
-            </a:p>
-          </p:txBody>
-        </p:sp>
-        <p:sp>
-          <p:nvSpPr>
-            <p:cNvPr id="26" name="Ellipse 25">
-              <a:extLst>
-                <a:ext uri="{FF2B5EF4-FFF2-40B4-BE49-F238E27FC236}">
-                  <a16:creationId xmlns:a16="http://schemas.microsoft.com/office/drawing/2014/main" id="{C8B31533-177C-08F0-8D60-F09EA6330F45}"/>
-                </a:ext>
-              </a:extLst>
-            </p:cNvPr>
-            <p:cNvSpPr/>
-            <p:nvPr/>
-          </p:nvSpPr>
-          <p:spPr>
-            <a:xfrm>
-              <a:off x="9450636" y="1727813"/>
-              <a:ext cx="154236" cy="154235"/>
-            </a:xfrm>
-            <a:prstGeom prst="ellipse">
-              <a:avLst/>
-            </a:prstGeom>
-            <a:solidFill>
-              <a:schemeClr val="bg1"/>
-            </a:solidFill>
-            <a:ln>
-              <a:solidFill>
-                <a:schemeClr val="bg1"/>
-              </a:solidFill>
-            </a:ln>
-          </p:spPr>
-          <p:style>
-            <a:lnRef idx="2">
-              <a:schemeClr val="accent1">
-                <a:shade val="50000"/>
-              </a:schemeClr>
-            </a:lnRef>
-            <a:fillRef idx="1">
-              <a:schemeClr val="accent1"/>
-            </a:fillRef>
-            <a:effectRef idx="0">
-              <a:schemeClr val="accent1"/>
-            </a:effectRef>
-            <a:fontRef idx="minor">
-              <a:schemeClr val="lt1"/>
-            </a:fontRef>
-          </p:style>
-          <p:txBody>
-            <a:bodyPr rtlCol="0" anchor="ctr"/>
-            <a:lstStyle/>
-            <a:p>
-              <a:pPr algn="ctr"/>
-              <a:endParaRPr lang="fr-FR"/>
-            </a:p>
-          </p:txBody>
-        </p:sp>
-        <p:sp>
-          <p:nvSpPr>
-            <p:cNvPr id="27" name="Ellipse 26">
-              <a:extLst>
-                <a:ext uri="{FF2B5EF4-FFF2-40B4-BE49-F238E27FC236}">
-                  <a16:creationId xmlns:a16="http://schemas.microsoft.com/office/drawing/2014/main" id="{24427D7D-A34F-B99E-9724-733A8B3A90BA}"/>
-                </a:ext>
-              </a:extLst>
-            </p:cNvPr>
-            <p:cNvSpPr/>
-            <p:nvPr/>
-          </p:nvSpPr>
-          <p:spPr>
-            <a:xfrm>
-              <a:off x="8073528" y="4955753"/>
-              <a:ext cx="154236" cy="154235"/>
-            </a:xfrm>
-            <a:prstGeom prst="ellipse">
-              <a:avLst/>
-            </a:prstGeom>
-            <a:solidFill>
-              <a:schemeClr val="bg1"/>
-            </a:solidFill>
-            <a:ln>
-              <a:solidFill>
-                <a:schemeClr val="bg1"/>
-              </a:solidFill>
-            </a:ln>
-          </p:spPr>
-          <p:style>
-            <a:lnRef idx="2">
-              <a:schemeClr val="accent1">
-                <a:shade val="50000"/>
-              </a:schemeClr>
-            </a:lnRef>
-            <a:fillRef idx="1">
-              <a:schemeClr val="accent1"/>
-            </a:fillRef>
-            <a:effectRef idx="0">
-              <a:schemeClr val="accent1"/>
-            </a:effectRef>
-            <a:fontRef idx="minor">
-              <a:schemeClr val="lt1"/>
-            </a:fontRef>
-          </p:style>
-          <p:txBody>
-            <a:bodyPr rtlCol="0" anchor="ctr"/>
-            <a:lstStyle/>
-            <a:p>
-              <a:pPr algn="ctr"/>
-              <a:endParaRPr lang="fr-FR"/>
-            </a:p>
-          </p:txBody>
-        </p:sp>
-        <p:sp>
-          <p:nvSpPr>
-            <p:cNvPr id="28" name="Ellipse 27">
-              <a:extLst>
-                <a:ext uri="{FF2B5EF4-FFF2-40B4-BE49-F238E27FC236}">
-                  <a16:creationId xmlns:a16="http://schemas.microsoft.com/office/drawing/2014/main" id="{B38011E1-EFC4-D6D8-7A81-F99D07CB546E}"/>
-                </a:ext>
-              </a:extLst>
-            </p:cNvPr>
-            <p:cNvSpPr/>
-            <p:nvPr/>
-          </p:nvSpPr>
-          <p:spPr>
-            <a:xfrm>
-              <a:off x="6409981" y="2673426"/>
-              <a:ext cx="154236" cy="154235"/>
-            </a:xfrm>
-            <a:prstGeom prst="ellipse">
-              <a:avLst/>
-            </a:prstGeom>
-            <a:solidFill>
-              <a:schemeClr val="bg1"/>
-            </a:solidFill>
-            <a:ln>
-              <a:solidFill>
-                <a:schemeClr val="bg1"/>
-              </a:solidFill>
-            </a:ln>
-          </p:spPr>
-          <p:style>
-            <a:lnRef idx="2">
-              <a:schemeClr val="accent1">
-                <a:shade val="50000"/>
-              </a:schemeClr>
-            </a:lnRef>
-            <a:fillRef idx="1">
-              <a:schemeClr val="accent1"/>
-            </a:fillRef>
-            <a:effectRef idx="0">
-              <a:schemeClr val="accent1"/>
-            </a:effectRef>
-            <a:fontRef idx="minor">
-              <a:schemeClr val="lt1"/>
-            </a:fontRef>
-          </p:style>
-          <p:txBody>
-            <a:bodyPr rtlCol="0" anchor="ctr"/>
-            <a:lstStyle/>
-            <a:p>
-              <a:pPr algn="ctr"/>
-              <a:endParaRPr lang="fr-FR"/>
-            </a:p>
-          </p:txBody>
-        </p:sp>
-        <p:sp>
-          <p:nvSpPr>
-            <p:cNvPr id="29" name="Ellipse 28">
-              <a:extLst>
-                <a:ext uri="{FF2B5EF4-FFF2-40B4-BE49-F238E27FC236}">
-                  <a16:creationId xmlns:a16="http://schemas.microsoft.com/office/drawing/2014/main" id="{3B0BD411-5FBB-E770-0A2C-CCAD0925BE95}"/>
-                </a:ext>
-              </a:extLst>
-            </p:cNvPr>
-            <p:cNvSpPr/>
-            <p:nvPr/>
-          </p:nvSpPr>
-          <p:spPr>
-            <a:xfrm>
-              <a:off x="10199783" y="5660834"/>
-              <a:ext cx="154236" cy="154235"/>
-            </a:xfrm>
-            <a:prstGeom prst="ellipse">
-              <a:avLst/>
-            </a:prstGeom>
-            <a:solidFill>
-              <a:schemeClr val="bg1"/>
-            </a:solidFill>
-            <a:ln>
-              <a:solidFill>
-                <a:schemeClr val="bg1"/>
-              </a:solidFill>
-            </a:ln>
-          </p:spPr>
-          <p:style>
-            <a:lnRef idx="2">
-              <a:schemeClr val="accent1">
-                <a:shade val="50000"/>
-              </a:schemeClr>
-            </a:lnRef>
-            <a:fillRef idx="1">
-              <a:schemeClr val="accent1"/>
-            </a:fillRef>
-            <a:effectRef idx="0">
-              <a:schemeClr val="accent1"/>
-            </a:effectRef>
-            <a:fontRef idx="minor">
-              <a:schemeClr val="lt1"/>
-            </a:fontRef>
-          </p:style>
-          <p:txBody>
-            <a:bodyPr rtlCol="0" anchor="ctr"/>
-            <a:lstStyle/>
-            <a:p>
-              <a:pPr algn="ctr"/>
-              <a:endParaRPr lang="fr-FR"/>
-            </a:p>
-          </p:txBody>
-        </p:sp>
-        <p:sp>
-          <p:nvSpPr>
-            <p:cNvPr id="30" name="Ellipse 29">
-              <a:extLst>
-                <a:ext uri="{FF2B5EF4-FFF2-40B4-BE49-F238E27FC236}">
-                  <a16:creationId xmlns:a16="http://schemas.microsoft.com/office/drawing/2014/main" id="{81BA64A5-B253-6DC8-6EA8-44668593BD86}"/>
-                </a:ext>
-              </a:extLst>
-            </p:cNvPr>
-            <p:cNvSpPr/>
-            <p:nvPr/>
-          </p:nvSpPr>
-          <p:spPr>
-            <a:xfrm>
-              <a:off x="1727812" y="5231174"/>
-              <a:ext cx="154236" cy="154235"/>
-            </a:xfrm>
-            <a:prstGeom prst="ellipse">
-              <a:avLst/>
-            </a:prstGeom>
-            <a:solidFill>
-              <a:schemeClr val="bg1"/>
-            </a:solidFill>
-            <a:ln>
-              <a:solidFill>
-                <a:schemeClr val="bg1"/>
-              </a:solidFill>
-            </a:ln>
-          </p:spPr>
-          <p:style>
-            <a:lnRef idx="2">
-              <a:schemeClr val="accent1">
-                <a:shade val="50000"/>
-              </a:schemeClr>
-            </a:lnRef>
-            <a:fillRef idx="1">
-              <a:schemeClr val="accent1"/>
-            </a:fillRef>
-            <a:effectRef idx="0">
-              <a:schemeClr val="accent1"/>
-            </a:effectRef>
-            <a:fontRef idx="minor">
-              <a:schemeClr val="lt1"/>
-            </a:fontRef>
-          </p:style>
-          <p:txBody>
-            <a:bodyPr rtlCol="0" anchor="ctr"/>
-            <a:lstStyle/>
-            <a:p>
-              <a:pPr algn="ctr"/>
-              <a:endParaRPr lang="fr-FR"/>
-            </a:p>
-          </p:txBody>
-        </p:sp>
-        <p:sp>
-          <p:nvSpPr>
-            <p:cNvPr id="31" name="Ellipse 30">
-              <a:extLst>
-                <a:ext uri="{FF2B5EF4-FFF2-40B4-BE49-F238E27FC236}">
-                  <a16:creationId xmlns:a16="http://schemas.microsoft.com/office/drawing/2014/main" id="{92391D68-27A7-95E5-DD5C-074C30B98B30}"/>
-                </a:ext>
-              </a:extLst>
-            </p:cNvPr>
-            <p:cNvSpPr/>
-            <p:nvPr/>
-          </p:nvSpPr>
-          <p:spPr>
-            <a:xfrm>
-              <a:off x="2820318" y="3843052"/>
-              <a:ext cx="154236" cy="154235"/>
-            </a:xfrm>
-            <a:prstGeom prst="ellipse">
-              <a:avLst/>
-            </a:prstGeom>
-            <a:solidFill>
-              <a:schemeClr val="bg1"/>
-            </a:solidFill>
-            <a:ln>
-              <a:solidFill>
-                <a:schemeClr val="bg1"/>
-              </a:solidFill>
-            </a:ln>
-          </p:spPr>
-          <p:style>
-            <a:lnRef idx="2">
-              <a:schemeClr val="accent1">
-                <a:shade val="50000"/>
-              </a:schemeClr>
-            </a:lnRef>
-            <a:fillRef idx="1">
-              <a:schemeClr val="accent1"/>
-            </a:fillRef>
-            <a:effectRef idx="0">
-              <a:schemeClr val="accent1"/>
-            </a:effectRef>
-            <a:fontRef idx="minor">
-              <a:schemeClr val="lt1"/>
-            </a:fontRef>
-          </p:style>
-          <p:txBody>
-            <a:bodyPr rtlCol="0" anchor="ctr"/>
-            <a:lstStyle/>
-            <a:p>
-              <a:pPr algn="ctr"/>
-              <a:endParaRPr lang="fr-FR"/>
-            </a:p>
-          </p:txBody>
-        </p:sp>
-        <p:sp>
-          <p:nvSpPr>
-            <p:cNvPr id="32" name="Ellipse 31">
-              <a:extLst>
-                <a:ext uri="{FF2B5EF4-FFF2-40B4-BE49-F238E27FC236}">
-                  <a16:creationId xmlns:a16="http://schemas.microsoft.com/office/drawing/2014/main" id="{A8CA8E68-670A-A847-FFBC-080F9F317477}"/>
-                </a:ext>
-              </a:extLst>
-            </p:cNvPr>
-            <p:cNvSpPr/>
-            <p:nvPr/>
-          </p:nvSpPr>
-          <p:spPr>
-            <a:xfrm>
-              <a:off x="10331985" y="2804254"/>
-              <a:ext cx="154236" cy="154235"/>
-            </a:xfrm>
-            <a:prstGeom prst="ellipse">
-              <a:avLst/>
-            </a:prstGeom>
-            <a:solidFill>
-              <a:schemeClr val="bg1"/>
-            </a:solidFill>
-            <a:ln>
-              <a:solidFill>
-                <a:schemeClr val="bg1"/>
-              </a:solidFill>
-            </a:ln>
-          </p:spPr>
-          <p:style>
-            <a:lnRef idx="2">
-              <a:schemeClr val="accent1">
-                <a:shade val="50000"/>
-              </a:schemeClr>
-            </a:lnRef>
-            <a:fillRef idx="1">
-              <a:schemeClr val="accent1"/>
-            </a:fillRef>
-            <a:effectRef idx="0">
-              <a:schemeClr val="accent1"/>
-            </a:effectRef>
-            <a:fontRef idx="minor">
-              <a:schemeClr val="lt1"/>
-            </a:fontRef>
-          </p:style>
-          <p:txBody>
-            <a:bodyPr rtlCol="0" anchor="ctr"/>
-            <a:lstStyle/>
-            <a:p>
-              <a:pPr algn="ctr"/>
-              <a:endParaRPr lang="fr-FR"/>
-            </a:p>
-          </p:txBody>
-        </p:sp>
+              <a:ln>
+                <a:solidFill>
+                  <a:srgbClr val="00B050"/>
+                </a:solidFill>
+              </a:ln>
+            </p:spPr>
+            <p:style>
+              <a:lnRef idx="2">
+                <a:schemeClr val="accent1">
+                  <a:shade val="50000"/>
+                </a:schemeClr>
+              </a:lnRef>
+              <a:fillRef idx="1">
+                <a:schemeClr val="accent1"/>
+              </a:fillRef>
+              <a:effectRef idx="0">
+                <a:schemeClr val="accent1"/>
+              </a:effectRef>
+              <a:fontRef idx="minor">
+                <a:schemeClr val="lt1"/>
+              </a:fontRef>
+            </p:style>
+            <p:txBody>
+              <a:bodyPr rtlCol="0" anchor="ctr"/>
+              <a:lstStyle/>
+              <a:p>
+                <a:pPr algn="ctr"/>
+                <a:endParaRPr lang="fr-FR"/>
+              </a:p>
+            </p:txBody>
+          </p:sp>
+        </p:grpSp>
       </p:grpSp>
     </p:spTree>
     <p:extLst>
       <p:ext uri="{BB962C8B-B14F-4D97-AF65-F5344CB8AC3E}">
-        <p14:creationId xmlns:p14="http://schemas.microsoft.com/office/powerpoint/2010/main" val="140699926"/>
+        <p14:creationId xmlns:p14="http://schemas.microsoft.com/office/powerpoint/2010/main" val="2128863129"/>
       </p:ext>
     </p:extLst>
   </p:cSld>

</xml_diff>